<commit_message>
Updated pptx, updated stats and removed not needed csv files
</commit_message>
<xml_diff>
--- a/JurgenTan_CA1.pptx
+++ b/JurgenTan_CA1.pptx
@@ -6,11 +6,15 @@
   </p:sldMasterIdLst>
   <p:sldIdLst>
     <p:sldId id="256" r:id="rId2"/>
-    <p:sldId id="257" r:id="rId3"/>
-    <p:sldId id="258" r:id="rId4"/>
-    <p:sldId id="259" r:id="rId5"/>
-    <p:sldId id="260" r:id="rId6"/>
-    <p:sldId id="261" r:id="rId7"/>
+    <p:sldId id="262" r:id="rId3"/>
+    <p:sldId id="263" r:id="rId4"/>
+    <p:sldId id="264" r:id="rId5"/>
+    <p:sldId id="257" r:id="rId6"/>
+    <p:sldId id="258" r:id="rId7"/>
+    <p:sldId id="259" r:id="rId8"/>
+    <p:sldId id="265" r:id="rId9"/>
+    <p:sldId id="260" r:id="rId10"/>
+    <p:sldId id="261" r:id="rId11"/>
   </p:sldIdLst>
   <p:sldSz cx="12192000" cy="6858000"/>
   <p:notesSz cx="6858000" cy="9144000"/>
@@ -109,6 +113,11 @@
       </a:defRPr>
     </a:lvl9pPr>
   </p:defaultTextStyle>
+  <p:extLst>
+    <p:ext uri="{EFAFB233-063F-42B5-8137-9DF3F51BA10A}">
+      <p15:sldGuideLst xmlns:p15="http://schemas.microsoft.com/office/powerpoint/2012/main"/>
+    </p:ext>
+  </p:extLst>
 </p:presentation>
 </file>
 
@@ -3348,10 +3357,9 @@
           <a:lstStyle/>
           <a:p>
             <a:r>
-              <a:rPr lang="en-SG" dirty="0"/>
-              <a:t>Programming Data Science	</a:t>
-            </a:r>
-            <a:endParaRPr lang="en-US" dirty="0"/>
+              <a:rPr lang="en-US" dirty="0"/>
+              <a:t>Transport Data Analysis</a:t>
+            </a:r>
           </a:p>
         </p:txBody>
       </p:sp>
@@ -3412,7 +3420,7 @@
 </p:sld>
 </file>
 
-<file path=ppt/slides/slide2.xml><?xml version="1.0" encoding="utf-8"?>
+<file path=ppt/slides/slide10.xml><?xml version="1.0" encoding="utf-8"?>
 <p:sld xmlns:a="http://schemas.openxmlformats.org/drawingml/2006/main" xmlns:r="http://schemas.openxmlformats.org/officeDocument/2006/relationships" xmlns:p="http://schemas.openxmlformats.org/presentationml/2006/main">
   <p:cSld>
     <p:bg>
@@ -3437,68 +3445,186 @@
           <a:chExt cx="0" cy="0"/>
         </a:xfrm>
       </p:grpSpPr>
-      <p:sp>
-        <p:nvSpPr>
-          <p:cNvPr id="2" name="Title 1">
-            <a:extLst>
-              <a:ext uri="{FF2B5EF4-FFF2-40B4-BE49-F238E27FC236}">
-                <a16:creationId xmlns:a16="http://schemas.microsoft.com/office/drawing/2014/main" id="{4A218608-31C1-44E9-8383-CE4345C7EC42}"/>
-              </a:ext>
-            </a:extLst>
-          </p:cNvPr>
-          <p:cNvSpPr>
-            <a:spLocks noGrp="1"/>
-          </p:cNvSpPr>
-          <p:nvPr>
-            <p:ph type="title"/>
+      <p:sp useBgFill="1">
+        <p:nvSpPr>
+          <p:cNvPr id="2052" name="Rectangle 70">
+            <a:extLst>
+              <a:ext uri="{FF2B5EF4-FFF2-40B4-BE49-F238E27FC236}">
+                <a16:creationId xmlns:a16="http://schemas.microsoft.com/office/drawing/2014/main" id="{385E1BDC-A9B0-4A87-82E3-F3187F69A802}"/>
+              </a:ext>
+              <a:ext uri="{C183D7F6-B498-43B3-948B-1728B52AA6E4}">
+                <adec:decorative xmlns:adec="http://schemas.microsoft.com/office/drawing/2017/decorative" val="1"/>
+              </a:ext>
+            </a:extLst>
+          </p:cNvPr>
+          <p:cNvSpPr>
+            <a:spLocks noGrp="1" noRot="1" noChangeAspect="1" noMove="1" noResize="1" noEditPoints="1" noAdjustHandles="1" noChangeArrowheads="1" noChangeShapeType="1" noTextEdit="1"/>
+          </p:cNvSpPr>
+          <p:nvPr>
+            <p:extLst>
+              <p:ext uri="{386F3935-93C4-4BCD-93E2-E3B085C9AB24}">
+                <p16:designElem xmlns:p16="http://schemas.microsoft.com/office/powerpoint/2015/main" val="1"/>
+              </p:ext>
+            </p:extLst>
           </p:nvPr>
         </p:nvSpPr>
         <p:spPr>
           <a:xfrm>
-            <a:off x="838200" y="640080"/>
-            <a:ext cx="2798064" cy="2304288"/>
-          </a:xfrm>
-        </p:spPr>
-        <p:txBody>
-          <a:bodyPr vert="horz" lIns="91440" tIns="45720" rIns="91440" bIns="45720" rtlCol="0" anchor="b">
-            <a:normAutofit/>
-          </a:bodyPr>
-          <a:lstStyle/>
-          <a:p>
-            <a:r>
-              <a:rPr lang="en-US" sz="3100" kern="1200" dirty="0">
-                <a:solidFill>
-                  <a:schemeClr val="tx1"/>
-                </a:solidFill>
-                <a:latin typeface="+mj-lt"/>
-                <a:ea typeface="+mj-ea"/>
-                <a:cs typeface="+mj-cs"/>
-              </a:rPr>
-              <a:t>Price Difference Between The Months From 2015 to 2018 For Category A</a:t>
-            </a:r>
-          </a:p>
-        </p:txBody>
-      </p:sp>
-      <p:sp>
-        <p:nvSpPr>
-          <p:cNvPr id="5" name="TextBox 4">
-            <a:extLst>
-              <a:ext uri="{FF2B5EF4-FFF2-40B4-BE49-F238E27FC236}">
-                <a16:creationId xmlns:a16="http://schemas.microsoft.com/office/drawing/2014/main" id="{15A2AB56-1221-4C94-94AE-D956AC4782D1}"/>
-              </a:ext>
-            </a:extLst>
-          </p:cNvPr>
-          <p:cNvSpPr txBox="1"/>
-          <p:nvPr/>
-        </p:nvSpPr>
-        <p:spPr>
-          <a:xfrm>
-            <a:off x="838200" y="3136392"/>
-            <a:ext cx="2770632" cy="3081528"/>
+            <a:off x="0" y="0"/>
+            <a:ext cx="12192000" cy="6858000"/>
           </a:xfrm>
           <a:prstGeom prst="rect">
             <a:avLst/>
           </a:prstGeom>
+          <a:ln>
+            <a:noFill/>
+          </a:ln>
+        </p:spPr>
+        <p:style>
+          <a:lnRef idx="2">
+            <a:schemeClr val="accent1">
+              <a:shade val="50000"/>
+            </a:schemeClr>
+          </a:lnRef>
+          <a:fillRef idx="1">
+            <a:schemeClr val="accent1"/>
+          </a:fillRef>
+          <a:effectRef idx="0">
+            <a:schemeClr val="accent1"/>
+          </a:effectRef>
+          <a:fontRef idx="minor">
+            <a:schemeClr val="lt1"/>
+          </a:fontRef>
+        </p:style>
+        <p:txBody>
+          <a:bodyPr rtlCol="0" anchor="ctr"/>
+          <a:lstStyle/>
+          <a:p>
+            <a:pPr algn="ctr"/>
+            <a:endParaRPr lang="en-US"/>
+          </a:p>
+        </p:txBody>
+      </p:sp>
+      <p:sp useBgFill="1">
+        <p:nvSpPr>
+          <p:cNvPr id="2053" name="Rectangle 72">
+            <a:extLst>
+              <a:ext uri="{FF2B5EF4-FFF2-40B4-BE49-F238E27FC236}">
+                <a16:creationId xmlns:a16="http://schemas.microsoft.com/office/drawing/2014/main" id="{0990C621-3B8B-4820-8328-D47EF7CE823C}"/>
+              </a:ext>
+              <a:ext uri="{C183D7F6-B498-43B3-948B-1728B52AA6E4}">
+                <adec:decorative xmlns:adec="http://schemas.microsoft.com/office/drawing/2017/decorative" val="1"/>
+              </a:ext>
+            </a:extLst>
+          </p:cNvPr>
+          <p:cNvSpPr>
+            <a:spLocks noGrp="1" noRot="1" noChangeAspect="1" noMove="1" noResize="1" noEditPoints="1" noAdjustHandles="1" noChangeArrowheads="1" noChangeShapeType="1" noTextEdit="1"/>
+          </p:cNvSpPr>
+          <p:nvPr>
+            <p:extLst>
+              <p:ext uri="{386F3935-93C4-4BCD-93E2-E3B085C9AB24}">
+                <p16:designElem xmlns:p16="http://schemas.microsoft.com/office/powerpoint/2015/main" val="1"/>
+              </p:ext>
+            </p:extLst>
+          </p:nvPr>
+        </p:nvSpPr>
+        <p:spPr>
+          <a:xfrm>
+            <a:off x="554416" y="365125"/>
+            <a:ext cx="11167447" cy="2089317"/>
+          </a:xfrm>
+          <a:prstGeom prst="rect">
+            <a:avLst/>
+          </a:prstGeom>
+          <a:ln w="12700">
+            <a:solidFill>
+              <a:srgbClr val="EFEFEF"/>
+            </a:solidFill>
+          </a:ln>
+          <a:effectLst>
+            <a:outerShdw blurRad="50800" dist="38100" dir="2700000" algn="tl" rotWithShape="0">
+              <a:schemeClr val="bg2">
+                <a:lumMod val="85000"/>
+                <a:alpha val="30000"/>
+              </a:schemeClr>
+            </a:outerShdw>
+          </a:effectLst>
+        </p:spPr>
+        <p:style>
+          <a:lnRef idx="2">
+            <a:schemeClr val="accent1">
+              <a:shade val="50000"/>
+            </a:schemeClr>
+          </a:lnRef>
+          <a:fillRef idx="1">
+            <a:schemeClr val="accent1"/>
+          </a:fillRef>
+          <a:effectRef idx="0">
+            <a:schemeClr val="accent1"/>
+          </a:effectRef>
+          <a:fontRef idx="minor">
+            <a:schemeClr val="lt1"/>
+          </a:fontRef>
+        </p:style>
+        <p:txBody>
+          <a:bodyPr rtlCol="0" anchor="ctr"/>
+          <a:lstStyle/>
+          <a:p>
+            <a:pPr marL="0" marR="0" lvl="0" indent="0" algn="ctr" defTabSz="914400" rtl="0" eaLnBrk="1" fontAlgn="auto" latinLnBrk="0" hangingPunct="1">
+              <a:lnSpc>
+                <a:spcPct val="100000"/>
+              </a:lnSpc>
+              <a:spcBef>
+                <a:spcPts val="0"/>
+              </a:spcBef>
+              <a:spcAft>
+                <a:spcPts val="0"/>
+              </a:spcAft>
+              <a:buClrTx/>
+              <a:buSzTx/>
+              <a:buFontTx/>
+              <a:buNone/>
+              <a:tabLst/>
+              <a:defRPr/>
+            </a:pPr>
+            <a:endParaRPr kumimoji="0" lang="en-US" sz="1800" b="0" i="0" u="none" strike="noStrike" kern="1200" cap="none" spc="0" normalizeH="0" baseline="0" noProof="0">
+              <a:ln>
+                <a:noFill/>
+              </a:ln>
+              <a:solidFill>
+                <a:prstClr val="white"/>
+              </a:solidFill>
+              <a:effectLst/>
+              <a:uLnTx/>
+              <a:uFillTx/>
+              <a:latin typeface="Calibri" panose="020F0502020204030204"/>
+              <a:ea typeface="+mn-ea"/>
+              <a:cs typeface="+mn-cs"/>
+            </a:endParaRPr>
+          </a:p>
+        </p:txBody>
+      </p:sp>
+      <p:sp>
+        <p:nvSpPr>
+          <p:cNvPr id="2" name="Title 1">
+            <a:extLst>
+              <a:ext uri="{FF2B5EF4-FFF2-40B4-BE49-F238E27FC236}">
+                <a16:creationId xmlns:a16="http://schemas.microsoft.com/office/drawing/2014/main" id="{4A218608-31C1-44E9-8383-CE4345C7EC42}"/>
+              </a:ext>
+            </a:extLst>
+          </p:cNvPr>
+          <p:cNvSpPr>
+            <a:spLocks noGrp="1"/>
+          </p:cNvSpPr>
+          <p:nvPr>
+            <p:ph type="title"/>
+          </p:nvPr>
+        </p:nvSpPr>
+        <p:spPr>
+          <a:xfrm>
+            <a:off x="1051560" y="586822"/>
+            <a:ext cx="3657600" cy="1645920"/>
+          </a:xfrm>
         </p:spPr>
         <p:txBody>
           <a:bodyPr vert="horz" lIns="91440" tIns="45720" rIns="91440" bIns="45720" rtlCol="0">
@@ -3506,70 +3632,233 @@
           </a:bodyPr>
           <a:lstStyle/>
           <a:p>
-            <a:pPr marL="285750" indent="-228600">
+            <a:r>
+              <a:rPr lang="en-US" sz="3200"/>
+              <a:t>The Number Of Decks In Singapore's HDB Carparks</a:t>
+            </a:r>
+            <a:endParaRPr lang="en-US" sz="3200" kern="1200">
+              <a:latin typeface="+mj-lt"/>
+              <a:ea typeface="+mj-ea"/>
+              <a:cs typeface="+mj-cs"/>
+            </a:endParaRPr>
+          </a:p>
+        </p:txBody>
+      </p:sp>
+      <p:sp>
+        <p:nvSpPr>
+          <p:cNvPr id="2054" name="Rectangle 74">
+            <a:extLst>
+              <a:ext uri="{FF2B5EF4-FFF2-40B4-BE49-F238E27FC236}">
+                <a16:creationId xmlns:a16="http://schemas.microsoft.com/office/drawing/2014/main" id="{C1A2385B-1D2A-4E17-84FA-6CB7F0AAE473}"/>
+              </a:ext>
+              <a:ext uri="{C183D7F6-B498-43B3-948B-1728B52AA6E4}">
+                <adec:decorative xmlns:adec="http://schemas.microsoft.com/office/drawing/2017/decorative" val="1"/>
+              </a:ext>
+            </a:extLst>
+          </p:cNvPr>
+          <p:cNvSpPr>
+            <a:spLocks noGrp="1" noRot="1" noChangeAspect="1" noMove="1" noResize="1" noEditPoints="1" noAdjustHandles="1" noChangeArrowheads="1" noChangeShapeType="1" noTextEdit="1"/>
+          </p:cNvSpPr>
+          <p:nvPr>
+            <p:extLst>
+              <p:ext uri="{386F3935-93C4-4BCD-93E2-E3B085C9AB24}">
+                <p16:designElem xmlns:p16="http://schemas.microsoft.com/office/powerpoint/2015/main" val="1"/>
+              </p:ext>
+            </p:extLst>
+          </p:nvPr>
+        </p:nvSpPr>
+        <p:spPr>
+          <a:xfrm>
+            <a:off x="490408" y="1057739"/>
+            <a:ext cx="128016" cy="704088"/>
+          </a:xfrm>
+          <a:prstGeom prst="rect">
+            <a:avLst/>
+          </a:prstGeom>
+          <a:solidFill>
+            <a:schemeClr val="accent2"/>
+          </a:solidFill>
+          <a:ln>
+            <a:noFill/>
+          </a:ln>
+        </p:spPr>
+        <p:style>
+          <a:lnRef idx="2">
+            <a:schemeClr val="accent1">
+              <a:shade val="50000"/>
+            </a:schemeClr>
+          </a:lnRef>
+          <a:fillRef idx="1">
+            <a:schemeClr val="accent1"/>
+          </a:fillRef>
+          <a:effectRef idx="0">
+            <a:schemeClr val="accent1"/>
+          </a:effectRef>
+          <a:fontRef idx="minor">
+            <a:schemeClr val="lt1"/>
+          </a:fontRef>
+        </p:style>
+        <p:txBody>
+          <a:bodyPr rtlCol="0" anchor="ctr"/>
+          <a:lstStyle/>
+          <a:p>
+            <a:pPr algn="ctr"/>
+            <a:endParaRPr lang="en-US" dirty="0">
+              <a:solidFill>
+                <a:prstClr val="white"/>
+              </a:solidFill>
+              <a:latin typeface="Calibri" panose="020F0502020204030204"/>
+            </a:endParaRPr>
+          </a:p>
+        </p:txBody>
+      </p:sp>
+      <p:sp>
+        <p:nvSpPr>
+          <p:cNvPr id="2055" name="Rectangle 76">
+            <a:extLst>
+              <a:ext uri="{FF2B5EF4-FFF2-40B4-BE49-F238E27FC236}">
+                <a16:creationId xmlns:a16="http://schemas.microsoft.com/office/drawing/2014/main" id="{5E791F2F-79DB-4CC0-9FA1-001E3E91E8B7}"/>
+              </a:ext>
+              <a:ext uri="{C183D7F6-B498-43B3-948B-1728B52AA6E4}">
+                <adec:decorative xmlns:adec="http://schemas.microsoft.com/office/drawing/2017/decorative" val="1"/>
+              </a:ext>
+            </a:extLst>
+          </p:cNvPr>
+          <p:cNvSpPr>
+            <a:spLocks noGrp="1" noRot="1" noChangeAspect="1" noMove="1" noResize="1" noEditPoints="1" noAdjustHandles="1" noChangeArrowheads="1" noChangeShapeType="1" noTextEdit="1"/>
+          </p:cNvSpPr>
+          <p:nvPr>
+            <p:extLst>
+              <p:ext uri="{386F3935-93C4-4BCD-93E2-E3B085C9AB24}">
+                <p16:designElem xmlns:p16="http://schemas.microsoft.com/office/powerpoint/2015/main" val="1"/>
+              </p:ext>
+            </p:extLst>
+          </p:nvPr>
+        </p:nvSpPr>
+        <p:spPr>
+          <a:xfrm rot="5400000">
+            <a:off x="4248113" y="1405210"/>
+            <a:ext cx="1463040" cy="9144"/>
+          </a:xfrm>
+          <a:prstGeom prst="rect">
+            <a:avLst/>
+          </a:prstGeom>
+          <a:solidFill>
+            <a:srgbClr val="D5D5D5"/>
+          </a:solidFill>
+          <a:ln w="3175">
+            <a:noFill/>
+          </a:ln>
+          <a:effectLst/>
+        </p:spPr>
+        <p:style>
+          <a:lnRef idx="2">
+            <a:schemeClr val="accent1">
+              <a:shade val="50000"/>
+            </a:schemeClr>
+          </a:lnRef>
+          <a:fillRef idx="1">
+            <a:schemeClr val="accent1"/>
+          </a:fillRef>
+          <a:effectRef idx="0">
+            <a:schemeClr val="accent1"/>
+          </a:effectRef>
+          <a:fontRef idx="minor">
+            <a:schemeClr val="lt1"/>
+          </a:fontRef>
+        </p:style>
+        <p:txBody>
+          <a:bodyPr rtlCol="0" anchor="ctr"/>
+          <a:lstStyle/>
+          <a:p>
+            <a:pPr marL="0" marR="0" lvl="0" indent="0" algn="ctr" defTabSz="914400" rtl="0" eaLnBrk="1" fontAlgn="auto" latinLnBrk="0" hangingPunct="1">
               <a:lnSpc>
-                <a:spcPct val="90000"/>
+                <a:spcPct val="100000"/>
               </a:lnSpc>
+              <a:spcBef>
+                <a:spcPts val="0"/>
+              </a:spcBef>
               <a:spcAft>
-                <a:spcPts val="600"/>
+                <a:spcPts val="0"/>
               </a:spcAft>
-              <a:buFont typeface="Arial" panose="020B0604020202020204" pitchFamily="34" charset="0"/>
-              <a:buChar char="•"/>
+              <a:buClrTx/>
+              <a:buSzTx/>
+              <a:buFontTx/>
+              <a:buNone/>
+              <a:tabLst/>
+              <a:defRPr/>
             </a:pPr>
-            <a:r>
-              <a:rPr lang="en-US"/>
-              <a:t>Asdasdadsa</a:t>
-            </a:r>
-          </a:p>
-          <a:p>
-            <a:pPr marL="285750" indent="-228600">
-              <a:lnSpc>
-                <a:spcPct val="90000"/>
-              </a:lnSpc>
-              <a:spcAft>
-                <a:spcPts val="600"/>
-              </a:spcAft>
-              <a:buFont typeface="Arial" panose="020B0604020202020204" pitchFamily="34" charset="0"/>
-              <a:buChar char="•"/>
-            </a:pPr>
-            <a:r>
-              <a:rPr lang="en-US"/>
-              <a:t>Asdasd</a:t>
-            </a:r>
-          </a:p>
-          <a:p>
-            <a:pPr marL="285750" indent="-228600">
-              <a:lnSpc>
-                <a:spcPct val="90000"/>
-              </a:lnSpc>
-              <a:spcAft>
-                <a:spcPts val="600"/>
-              </a:spcAft>
-              <a:buFont typeface="Arial" panose="020B0604020202020204" pitchFamily="34" charset="0"/>
-              <a:buChar char="•"/>
-            </a:pPr>
-            <a:r>
-              <a:rPr lang="en-US"/>
-              <a:t>das</a:t>
-            </a:r>
+            <a:endParaRPr kumimoji="0" lang="en-US" sz="1800" b="0" i="0" u="none" strike="noStrike" kern="1200" cap="none" spc="0" normalizeH="0" baseline="0" noProof="0">
+              <a:ln>
+                <a:noFill/>
+              </a:ln>
+              <a:solidFill>
+                <a:prstClr val="white"/>
+              </a:solidFill>
+              <a:effectLst/>
+              <a:uLnTx/>
+              <a:uFillTx/>
+              <a:latin typeface="Calibri" panose="020F0502020204030204"/>
+              <a:ea typeface="+mn-ea"/>
+              <a:cs typeface="+mn-cs"/>
+            </a:endParaRPr>
+          </a:p>
+        </p:txBody>
+      </p:sp>
+      <p:sp>
+        <p:nvSpPr>
+          <p:cNvPr id="3" name="Content Placeholder 2">
+            <a:extLst>
+              <a:ext uri="{FF2B5EF4-FFF2-40B4-BE49-F238E27FC236}">
+                <a16:creationId xmlns:a16="http://schemas.microsoft.com/office/drawing/2014/main" id="{A6DD3B12-764D-405A-AEA8-DD9E1336EA5E}"/>
+              </a:ext>
+            </a:extLst>
+          </p:cNvPr>
+          <p:cNvSpPr>
+            <a:spLocks noGrp="1"/>
+          </p:cNvSpPr>
+          <p:nvPr>
+            <p:ph idx="1"/>
+          </p:nvPr>
+        </p:nvSpPr>
+        <p:spPr>
+          <a:xfrm>
+            <a:off x="5250106" y="586822"/>
+            <a:ext cx="6106742" cy="1645920"/>
+          </a:xfrm>
+        </p:spPr>
+        <p:txBody>
+          <a:bodyPr vert="horz" lIns="91440" tIns="45720" rIns="91440" bIns="45720" rtlCol="0" anchor="ctr">
+            <a:normAutofit/>
+          </a:bodyPr>
+          <a:lstStyle/>
+          <a:p>
+            <a:pPr marL="285750"/>
+            <a:r>
+              <a:rPr lang="en-US" sz="1800" dirty="0"/>
+              <a:t>Most HDB Car Parks are </a:t>
+            </a:r>
+            <a:r>
+              <a:rPr lang="en-US" sz="1800"/>
+              <a:t>1 leveled </a:t>
+            </a:r>
+            <a:endParaRPr lang="en-US" sz="1800" dirty="0"/>
           </a:p>
         </p:txBody>
       </p:sp>
       <p:pic>
         <p:nvPicPr>
-          <p:cNvPr id="1026" name="Picture 2">
-            <a:extLst>
-              <a:ext uri="{FF2B5EF4-FFF2-40B4-BE49-F238E27FC236}">
-                <a16:creationId xmlns:a16="http://schemas.microsoft.com/office/drawing/2014/main" id="{17B69302-28B3-458D-8EA6-8B66FB8AE111}"/>
+          <p:cNvPr id="2050" name="Picture 2">
+            <a:extLst>
+              <a:ext uri="{FF2B5EF4-FFF2-40B4-BE49-F238E27FC236}">
+                <a16:creationId xmlns:a16="http://schemas.microsoft.com/office/drawing/2014/main" id="{DE55DAD0-3FAE-4EAD-A860-6310F56F3A73}"/>
               </a:ext>
             </a:extLst>
           </p:cNvPr>
           <p:cNvPicPr>
-            <a:picLocks noGrp="1" noChangeAspect="1" noChangeArrowheads="1"/>
+            <a:picLocks noChangeAspect="1" noChangeArrowheads="1"/>
           </p:cNvPicPr>
-          <p:nvPr>
-            <p:ph idx="1"/>
-          </p:nvPr>
+          <p:nvPr/>
         </p:nvPicPr>
         <p:blipFill>
           <a:blip r:embed="rId2">
@@ -3585,8 +3874,8 @@
         </p:blipFill>
         <p:spPr bwMode="auto">
           <a:xfrm>
-            <a:off x="4276344" y="1579946"/>
-            <a:ext cx="7251192" cy="3698107"/>
+            <a:off x="5909211" y="2819566"/>
+            <a:ext cx="6136600" cy="3145006"/>
           </a:xfrm>
           <a:prstGeom prst="rect">
             <a:avLst/>
@@ -3603,10 +3892,192 @@
           </a:extLst>
         </p:spPr>
       </p:pic>
+      <p:pic>
+        <p:nvPicPr>
+          <p:cNvPr id="5" name="Picture 4">
+            <a:extLst>
+              <a:ext uri="{FF2B5EF4-FFF2-40B4-BE49-F238E27FC236}">
+                <a16:creationId xmlns:a16="http://schemas.microsoft.com/office/drawing/2014/main" id="{964319EC-1690-422B-B9A6-C7B8E80F1F83}"/>
+              </a:ext>
+            </a:extLst>
+          </p:cNvPr>
+          <p:cNvPicPr>
+            <a:picLocks noChangeAspect="1"/>
+          </p:cNvPicPr>
+          <p:nvPr/>
+        </p:nvPicPr>
+        <p:blipFill>
+          <a:blip r:embed="rId3"/>
+          <a:stretch>
+            <a:fillRect/>
+          </a:stretch>
+        </p:blipFill>
+        <p:spPr>
+          <a:xfrm>
+            <a:off x="146189" y="3965836"/>
+            <a:ext cx="5616833" cy="1351419"/>
+          </a:xfrm>
+          <a:prstGeom prst="rect">
+            <a:avLst/>
+          </a:prstGeom>
+        </p:spPr>
+      </p:pic>
+      <p:pic>
+        <p:nvPicPr>
+          <p:cNvPr id="6" name="Picture 5">
+            <a:extLst>
+              <a:ext uri="{FF2B5EF4-FFF2-40B4-BE49-F238E27FC236}">
+                <a16:creationId xmlns:a16="http://schemas.microsoft.com/office/drawing/2014/main" id="{E811D79E-CEF3-4EAB-817D-7CABA1DFF9AD}"/>
+              </a:ext>
+            </a:extLst>
+          </p:cNvPr>
+          <p:cNvPicPr>
+            <a:picLocks noChangeAspect="1"/>
+          </p:cNvPicPr>
+          <p:nvPr/>
+        </p:nvPicPr>
+        <p:blipFill>
+          <a:blip r:embed="rId4"/>
+          <a:stretch>
+            <a:fillRect/>
+          </a:stretch>
+        </p:blipFill>
+        <p:spPr>
+          <a:xfrm>
+            <a:off x="45714" y="5859797"/>
+            <a:ext cx="5863498" cy="136216"/>
+          </a:xfrm>
+          <a:prstGeom prst="rect">
+            <a:avLst/>
+          </a:prstGeom>
+        </p:spPr>
+      </p:pic>
     </p:spTree>
     <p:extLst>
       <p:ext uri="{BB962C8B-B14F-4D97-AF65-F5344CB8AC3E}">
-        <p14:creationId xmlns:p14="http://schemas.microsoft.com/office/powerpoint/2010/main" val="1083457882"/>
+        <p14:creationId xmlns:p14="http://schemas.microsoft.com/office/powerpoint/2010/main" val="2080557547"/>
+      </p:ext>
+    </p:extLst>
+  </p:cSld>
+  <p:clrMapOvr>
+    <a:masterClrMapping/>
+  </p:clrMapOvr>
+</p:sld>
+</file>
+
+<file path=ppt/slides/slide2.xml><?xml version="1.0" encoding="utf-8"?>
+<p:sld xmlns:a="http://schemas.openxmlformats.org/drawingml/2006/main" xmlns:r="http://schemas.openxmlformats.org/officeDocument/2006/relationships" xmlns:p="http://schemas.openxmlformats.org/presentationml/2006/main">
+  <p:cSld>
+    <p:spTree>
+      <p:nvGrpSpPr>
+        <p:cNvPr id="1" name=""/>
+        <p:cNvGrpSpPr/>
+        <p:nvPr/>
+      </p:nvGrpSpPr>
+      <p:grpSpPr>
+        <a:xfrm>
+          <a:off x="0" y="0"/>
+          <a:ext cx="0" cy="0"/>
+          <a:chOff x="0" y="0"/>
+          <a:chExt cx="0" cy="0"/>
+        </a:xfrm>
+      </p:grpSpPr>
+      <p:sp>
+        <p:nvSpPr>
+          <p:cNvPr id="2" name="Title 1">
+            <a:extLst>
+              <a:ext uri="{FF2B5EF4-FFF2-40B4-BE49-F238E27FC236}">
+                <a16:creationId xmlns:a16="http://schemas.microsoft.com/office/drawing/2014/main" id="{71988273-5B1A-427E-875E-7B5F9EFC7E56}"/>
+              </a:ext>
+            </a:extLst>
+          </p:cNvPr>
+          <p:cNvSpPr>
+            <a:spLocks noGrp="1"/>
+          </p:cNvSpPr>
+          <p:nvPr>
+            <p:ph type="title"/>
+          </p:nvPr>
+        </p:nvSpPr>
+        <p:spPr/>
+        <p:txBody>
+          <a:bodyPr/>
+          <a:lstStyle/>
+          <a:p>
+            <a:r>
+              <a:rPr lang="en-SG" dirty="0"/>
+              <a:t>URLs</a:t>
+            </a:r>
+          </a:p>
+        </p:txBody>
+      </p:sp>
+      <p:sp>
+        <p:nvSpPr>
+          <p:cNvPr id="3" name="Content Placeholder 2">
+            <a:extLst>
+              <a:ext uri="{FF2B5EF4-FFF2-40B4-BE49-F238E27FC236}">
+                <a16:creationId xmlns:a16="http://schemas.microsoft.com/office/drawing/2014/main" id="{EA7FE453-1E75-462F-B41C-294B830962BA}"/>
+              </a:ext>
+            </a:extLst>
+          </p:cNvPr>
+          <p:cNvSpPr>
+            <a:spLocks noGrp="1"/>
+          </p:cNvSpPr>
+          <p:nvPr>
+            <p:ph idx="1"/>
+          </p:nvPr>
+        </p:nvSpPr>
+        <p:spPr/>
+        <p:txBody>
+          <a:bodyPr/>
+          <a:lstStyle/>
+          <a:p>
+            <a:r>
+              <a:rPr lang="en-SG" dirty="0"/>
+              <a:t>COE Results : </a:t>
+            </a:r>
+            <a:r>
+              <a:rPr lang="en-SG" dirty="0">
+                <a:hlinkClick r:id="rId2"/>
+              </a:rPr>
+              <a:t>https://data.gov.sg/dataset/coe-bidding-results</a:t>
+            </a:r>
+            <a:endParaRPr lang="en-SG" dirty="0"/>
+          </a:p>
+          <a:p>
+            <a:r>
+              <a:rPr lang="en-SG" dirty="0"/>
+              <a:t>Driving Licence: </a:t>
+            </a:r>
+            <a:r>
+              <a:rPr lang="en-SG" dirty="0">
+                <a:hlinkClick r:id="rId3"/>
+              </a:rPr>
+              <a:t>https://data.gov.sg/dataset/driving-licence-information-qualified-driving-licence-holders</a:t>
+            </a:r>
+            <a:endParaRPr lang="en-SG" dirty="0"/>
+          </a:p>
+          <a:p>
+            <a:r>
+              <a:rPr lang="en-SG" dirty="0"/>
+              <a:t>HDB Carpark </a:t>
+            </a:r>
+            <a:r>
+              <a:rPr lang="en-SG" dirty="0">
+                <a:hlinkClick r:id="rId4"/>
+              </a:rPr>
+              <a:t>https://data.gov.sg/dataset/hdb-carpark-information</a:t>
+            </a:r>
+            <a:endParaRPr lang="en-SG" dirty="0"/>
+          </a:p>
+          <a:p>
+            <a:endParaRPr lang="en-SG" dirty="0"/>
+          </a:p>
+        </p:txBody>
+      </p:sp>
+    </p:spTree>
+    <p:extLst>
+      <p:ext uri="{BB962C8B-B14F-4D97-AF65-F5344CB8AC3E}">
+        <p14:creationId xmlns:p14="http://schemas.microsoft.com/office/powerpoint/2010/main" val="2605298669"/>
       </p:ext>
     </p:extLst>
   </p:cSld>
@@ -3643,50 +4114,306 @@
       </p:grpSpPr>
       <p:sp>
         <p:nvSpPr>
-          <p:cNvPr id="2" name="Title 1">
-            <a:extLst>
-              <a:ext uri="{FF2B5EF4-FFF2-40B4-BE49-F238E27FC236}">
-                <a16:creationId xmlns:a16="http://schemas.microsoft.com/office/drawing/2014/main" id="{4A218608-31C1-44E9-8383-CE4345C7EC42}"/>
-              </a:ext>
-            </a:extLst>
-          </p:cNvPr>
-          <p:cNvSpPr>
-            <a:spLocks noGrp="1"/>
-          </p:cNvSpPr>
-          <p:nvPr>
-            <p:ph type="title"/>
+          <p:cNvPr id="43" name="Freeform 11">
+            <a:extLst>
+              <a:ext uri="{FF2B5EF4-FFF2-40B4-BE49-F238E27FC236}">
+                <a16:creationId xmlns:a16="http://schemas.microsoft.com/office/drawing/2014/main" id="{A0BF428C-DA8B-4D99-9930-18F7F91D873D}"/>
+              </a:ext>
+              <a:ext uri="{C183D7F6-B498-43B3-948B-1728B52AA6E4}">
+                <adec:decorative xmlns:adec="http://schemas.microsoft.com/office/drawing/2017/decorative" val="1"/>
+              </a:ext>
+            </a:extLst>
+          </p:cNvPr>
+          <p:cNvSpPr>
+            <a:spLocks noGrp="1" noRot="1" noChangeAspect="1" noMove="1" noResize="1" noEditPoints="1" noAdjustHandles="1" noChangeArrowheads="1" noChangeShapeType="1" noTextEdit="1"/>
+          </p:cNvSpPr>
+          <p:nvPr>
+            <p:extLst>
+              <p:ext uri="{386F3935-93C4-4BCD-93E2-E3B085C9AB24}">
+                <p16:designElem xmlns:p16="http://schemas.microsoft.com/office/powerpoint/2015/main" val="1"/>
+              </p:ext>
+            </p:extLst>
           </p:nvPr>
         </p:nvSpPr>
         <p:spPr>
           <a:xfrm>
-            <a:off x="838200" y="640080"/>
-            <a:ext cx="2798064" cy="2304288"/>
-          </a:xfrm>
-        </p:spPr>
-        <p:txBody>
-          <a:bodyPr vert="horz" lIns="91440" tIns="45720" rIns="91440" bIns="45720" rtlCol="0" anchor="b">
+            <a:off x="4876801" y="1690688"/>
+            <a:ext cx="7316944" cy="5167312"/>
+          </a:xfrm>
+          <a:custGeom>
+            <a:avLst/>
+            <a:gdLst>
+              <a:gd name="connsiteX0" fmla="*/ 0 w 7316944"/>
+              <a:gd name="connsiteY0" fmla="*/ 0 h 5167312"/>
+              <a:gd name="connsiteX1" fmla="*/ 7316944 w 7316944"/>
+              <a:gd name="connsiteY1" fmla="*/ 0 h 5167312"/>
+              <a:gd name="connsiteX2" fmla="*/ 7316944 w 7316944"/>
+              <a:gd name="connsiteY2" fmla="*/ 5167312 h 5167312"/>
+              <a:gd name="connsiteX3" fmla="*/ 472697 w 7316944"/>
+              <a:gd name="connsiteY3" fmla="*/ 5167312 h 5167312"/>
+              <a:gd name="connsiteX4" fmla="*/ 2866576 w 7316944"/>
+              <a:gd name="connsiteY4" fmla="*/ 952 h 5167312"/>
+              <a:gd name="connsiteX5" fmla="*/ 0 w 7316944"/>
+              <a:gd name="connsiteY5" fmla="*/ 952 h 5167312"/>
+            </a:gdLst>
+            <a:ahLst/>
+            <a:cxnLst>
+              <a:cxn ang="0">
+                <a:pos x="connsiteX0" y="connsiteY0"/>
+              </a:cxn>
+              <a:cxn ang="0">
+                <a:pos x="connsiteX1" y="connsiteY1"/>
+              </a:cxn>
+              <a:cxn ang="0">
+                <a:pos x="connsiteX2" y="connsiteY2"/>
+              </a:cxn>
+              <a:cxn ang="0">
+                <a:pos x="connsiteX3" y="connsiteY3"/>
+              </a:cxn>
+              <a:cxn ang="0">
+                <a:pos x="connsiteX4" y="connsiteY4"/>
+              </a:cxn>
+              <a:cxn ang="0">
+                <a:pos x="connsiteX5" y="connsiteY5"/>
+              </a:cxn>
+            </a:cxnLst>
+            <a:rect l="l" t="t" r="r" b="b"/>
+            <a:pathLst>
+              <a:path w="7316944" h="5167312">
+                <a:moveTo>
+                  <a:pt x="0" y="0"/>
+                </a:moveTo>
+                <a:lnTo>
+                  <a:pt x="7316944" y="0"/>
+                </a:lnTo>
+                <a:lnTo>
+                  <a:pt x="7316944" y="5167312"/>
+                </a:lnTo>
+                <a:lnTo>
+                  <a:pt x="472697" y="5167312"/>
+                </a:lnTo>
+                <a:lnTo>
+                  <a:pt x="2866576" y="952"/>
+                </a:lnTo>
+                <a:lnTo>
+                  <a:pt x="0" y="952"/>
+                </a:lnTo>
+                <a:close/>
+              </a:path>
+            </a:pathLst>
+          </a:custGeom>
+          <a:solidFill>
+            <a:srgbClr val="A6A6A6">
+              <a:alpha val="70000"/>
+            </a:srgbClr>
+          </a:solidFill>
+          <a:ln>
+            <a:noFill/>
+          </a:ln>
+        </p:spPr>
+        <p:style>
+          <a:lnRef idx="2">
+            <a:schemeClr val="accent1">
+              <a:shade val="50000"/>
+            </a:schemeClr>
+          </a:lnRef>
+          <a:fillRef idx="1">
+            <a:schemeClr val="accent1"/>
+          </a:fillRef>
+          <a:effectRef idx="0">
+            <a:schemeClr val="accent1"/>
+          </a:effectRef>
+          <a:fontRef idx="minor">
+            <a:schemeClr val="lt1"/>
+          </a:fontRef>
+        </p:style>
+        <p:txBody>
+          <a:bodyPr wrap="square" rtlCol="0" anchor="ctr">
+            <a:noAutofit/>
+          </a:bodyPr>
+          <a:lstStyle/>
+          <a:p>
+            <a:pPr algn="ctr"/>
+            <a:endParaRPr lang="en-US"/>
+          </a:p>
+        </p:txBody>
+      </p:sp>
+      <p:sp>
+        <p:nvSpPr>
+          <p:cNvPr id="45" name="Freeform 37">
+            <a:extLst>
+              <a:ext uri="{FF2B5EF4-FFF2-40B4-BE49-F238E27FC236}">
+                <a16:creationId xmlns:a16="http://schemas.microsoft.com/office/drawing/2014/main" id="{A03E2379-8871-408A-95CE-7AAE8FA53AE5}"/>
+              </a:ext>
+              <a:ext uri="{C183D7F6-B498-43B3-948B-1728B52AA6E4}">
+                <adec:decorative xmlns:adec="http://schemas.microsoft.com/office/drawing/2017/decorative" val="1"/>
+              </a:ext>
+            </a:extLst>
+          </p:cNvPr>
+          <p:cNvSpPr>
+            <a:spLocks noGrp="1" noRot="1" noChangeAspect="1" noMove="1" noResize="1" noEditPoints="1" noAdjustHandles="1" noChangeArrowheads="1" noChangeShapeType="1" noTextEdit="1"/>
+          </p:cNvSpPr>
+          <p:nvPr>
+            <p:extLst>
+              <p:ext uri="{386F3935-93C4-4BCD-93E2-E3B085C9AB24}">
+                <p16:designElem xmlns:p16="http://schemas.microsoft.com/office/powerpoint/2015/main" val="1"/>
+              </p:ext>
+            </p:extLst>
+          </p:nvPr>
+        </p:nvSpPr>
+        <p:spPr>
+          <a:xfrm flipV="1">
+            <a:off x="-1746" y="1691164"/>
+            <a:ext cx="7571262" cy="5166360"/>
+          </a:xfrm>
+          <a:custGeom>
+            <a:avLst/>
+            <a:gdLst>
+              <a:gd name="connsiteX0" fmla="*/ 0 w 7571262"/>
+              <a:gd name="connsiteY0" fmla="*/ 5166360 h 5166360"/>
+              <a:gd name="connsiteX1" fmla="*/ 7571262 w 7571262"/>
+              <a:gd name="connsiteY1" fmla="*/ 5166360 h 5166360"/>
+              <a:gd name="connsiteX2" fmla="*/ 5177382 w 7571262"/>
+              <a:gd name="connsiteY2" fmla="*/ 0 h 5166360"/>
+              <a:gd name="connsiteX3" fmla="*/ 5171159 w 7571262"/>
+              <a:gd name="connsiteY3" fmla="*/ 0 h 5166360"/>
+              <a:gd name="connsiteX4" fmla="*/ 3981368 w 7571262"/>
+              <a:gd name="connsiteY4" fmla="*/ 0 h 5166360"/>
+              <a:gd name="connsiteX5" fmla="*/ 2331323 w 7571262"/>
+              <a:gd name="connsiteY5" fmla="*/ 0 h 5166360"/>
+              <a:gd name="connsiteX6" fmla="*/ 0 w 7571262"/>
+              <a:gd name="connsiteY6" fmla="*/ 0 h 5166360"/>
+            </a:gdLst>
+            <a:ahLst/>
+            <a:cxnLst>
+              <a:cxn ang="0">
+                <a:pos x="connsiteX0" y="connsiteY0"/>
+              </a:cxn>
+              <a:cxn ang="0">
+                <a:pos x="connsiteX1" y="connsiteY1"/>
+              </a:cxn>
+              <a:cxn ang="0">
+                <a:pos x="connsiteX2" y="connsiteY2"/>
+              </a:cxn>
+              <a:cxn ang="0">
+                <a:pos x="connsiteX3" y="connsiteY3"/>
+              </a:cxn>
+              <a:cxn ang="0">
+                <a:pos x="connsiteX4" y="connsiteY4"/>
+              </a:cxn>
+              <a:cxn ang="0">
+                <a:pos x="connsiteX5" y="connsiteY5"/>
+              </a:cxn>
+              <a:cxn ang="0">
+                <a:pos x="connsiteX6" y="connsiteY6"/>
+              </a:cxn>
+            </a:cxnLst>
+            <a:rect l="l" t="t" r="r" b="b"/>
+            <a:pathLst>
+              <a:path w="7571262" h="5166360">
+                <a:moveTo>
+                  <a:pt x="0" y="5166360"/>
+                </a:moveTo>
+                <a:lnTo>
+                  <a:pt x="7571262" y="5166360"/>
+                </a:lnTo>
+                <a:lnTo>
+                  <a:pt x="5177382" y="0"/>
+                </a:lnTo>
+                <a:lnTo>
+                  <a:pt x="5171159" y="0"/>
+                </a:lnTo>
+                <a:lnTo>
+                  <a:pt x="3981368" y="0"/>
+                </a:lnTo>
+                <a:lnTo>
+                  <a:pt x="2331323" y="0"/>
+                </a:lnTo>
+                <a:lnTo>
+                  <a:pt x="0" y="0"/>
+                </a:lnTo>
+                <a:close/>
+              </a:path>
+            </a:pathLst>
+          </a:custGeom>
+          <a:solidFill>
+            <a:srgbClr val="404040"/>
+          </a:solidFill>
+          <a:ln>
+            <a:noFill/>
+          </a:ln>
+        </p:spPr>
+        <p:style>
+          <a:lnRef idx="2">
+            <a:schemeClr val="accent1">
+              <a:shade val="50000"/>
+            </a:schemeClr>
+          </a:lnRef>
+          <a:fillRef idx="1">
+            <a:schemeClr val="accent1"/>
+          </a:fillRef>
+          <a:effectRef idx="0">
+            <a:schemeClr val="accent1"/>
+          </a:effectRef>
+          <a:fontRef idx="minor">
+            <a:schemeClr val="lt1"/>
+          </a:fontRef>
+        </p:style>
+        <p:txBody>
+          <a:bodyPr wrap="square" rtlCol="0" anchor="ctr">
+            <a:noAutofit/>
+          </a:bodyPr>
+          <a:lstStyle/>
+          <a:p>
+            <a:pPr algn="ctr"/>
+            <a:endParaRPr lang="en-US"/>
+          </a:p>
+        </p:txBody>
+      </p:sp>
+      <p:sp>
+        <p:nvSpPr>
+          <p:cNvPr id="2" name="Title 1">
+            <a:extLst>
+              <a:ext uri="{FF2B5EF4-FFF2-40B4-BE49-F238E27FC236}">
+                <a16:creationId xmlns:a16="http://schemas.microsoft.com/office/drawing/2014/main" id="{72B4EAD7-F503-49EF-AC01-1F8773E70E5A}"/>
+              </a:ext>
+            </a:extLst>
+          </p:cNvPr>
+          <p:cNvSpPr>
+            <a:spLocks noGrp="1"/>
+          </p:cNvSpPr>
+          <p:nvPr>
+            <p:ph type="title"/>
+          </p:nvPr>
+        </p:nvSpPr>
+        <p:spPr>
+          <a:xfrm>
+            <a:off x="838200" y="365125"/>
+            <a:ext cx="10515600" cy="1325563"/>
+          </a:xfrm>
+          <a:prstGeom prst="ellipse">
+            <a:avLst/>
+          </a:prstGeom>
+        </p:spPr>
+        <p:txBody>
+          <a:bodyPr>
             <a:normAutofit/>
           </a:bodyPr>
           <a:lstStyle/>
           <a:p>
             <a:r>
-              <a:rPr lang="en-US" sz="3100" dirty="0"/>
-              <a:t>The Cost Of Category B From 2015 to 2018</a:t>
-            </a:r>
-            <a:endParaRPr lang="en-US" sz="3100" kern="1200" dirty="0">
-              <a:latin typeface="+mj-lt"/>
-              <a:ea typeface="+mj-ea"/>
-              <a:cs typeface="+mj-cs"/>
-            </a:endParaRPr>
-          </a:p>
-        </p:txBody>
-      </p:sp>
-      <p:sp>
-        <p:nvSpPr>
-          <p:cNvPr id="3" name="Content Placeholder 2">
-            <a:extLst>
-              <a:ext uri="{FF2B5EF4-FFF2-40B4-BE49-F238E27FC236}">
-                <a16:creationId xmlns:a16="http://schemas.microsoft.com/office/drawing/2014/main" id="{E3C6CBFA-4797-4967-970C-1917E7CEABE2}"/>
+              <a:rPr lang="en-SG"/>
+              <a:t>COE Results Dataset</a:t>
+            </a:r>
+          </a:p>
+        </p:txBody>
+      </p:sp>
+      <p:sp>
+        <p:nvSpPr>
+          <p:cNvPr id="9" name="Content Placeholder 8">
+            <a:extLst>
+              <a:ext uri="{FF2B5EF4-FFF2-40B4-BE49-F238E27FC236}">
+                <a16:creationId xmlns:a16="http://schemas.microsoft.com/office/drawing/2014/main" id="{F21CBD08-BFE3-4F3D-8AA2-ECBBD76AE7B3}"/>
               </a:ext>
             </a:extLst>
           </p:cNvPr>
@@ -3699,88 +4426,227 @@
         </p:nvSpPr>
         <p:spPr>
           <a:xfrm>
-            <a:off x="838200" y="3136392"/>
-            <a:ext cx="2770632" cy="3081528"/>
-          </a:xfrm>
-        </p:spPr>
-        <p:txBody>
-          <a:bodyPr vert="horz" lIns="91440" tIns="45720" rIns="91440" bIns="45720" rtlCol="0">
+            <a:off x="838200" y="2015406"/>
+            <a:ext cx="5097779" cy="4065986"/>
+          </a:xfrm>
+        </p:spPr>
+        <p:txBody>
+          <a:bodyPr anchor="t">
             <a:normAutofit/>
           </a:bodyPr>
           <a:lstStyle/>
           <a:p>
-            <a:pPr marL="285750"/>
-            <a:r>
-              <a:rPr lang="en-US" sz="1800"/>
-              <a:t>Asdasdadsa</a:t>
-            </a:r>
-          </a:p>
-          <a:p>
-            <a:pPr marL="285750"/>
-            <a:r>
-              <a:rPr lang="en-US" sz="1800"/>
-              <a:t>Asdasd</a:t>
-            </a:r>
-          </a:p>
-          <a:p>
-            <a:pPr marL="285750"/>
-            <a:r>
-              <a:rPr lang="en-US" sz="1800"/>
-              <a:t>das</a:t>
+            <a:r>
+              <a:rPr lang="en-GB" sz="2000">
+                <a:solidFill>
+                  <a:srgbClr val="FFFFFF"/>
+                </a:solidFill>
+              </a:rPr>
+              <a:t>Bidding Number : 1 (Week 1) &amp; 2 (Week 3)</a:t>
+            </a:r>
+          </a:p>
+          <a:p>
+            <a:r>
+              <a:rPr lang="en-GB" sz="2000">
+                <a:solidFill>
+                  <a:srgbClr val="FFFFFF"/>
+                </a:solidFill>
+              </a:rPr>
+              <a:t>Category A: Car up to 1600CC &amp; 97KW</a:t>
+            </a:r>
+          </a:p>
+          <a:p>
+            <a:r>
+              <a:rPr lang="en-GB" sz="2000">
+                <a:solidFill>
+                  <a:srgbClr val="FFFFFF"/>
+                </a:solidFill>
+              </a:rPr>
+              <a:t>Category B: Car above 1600CC or 97KW</a:t>
+            </a:r>
+          </a:p>
+          <a:p>
+            <a:r>
+              <a:rPr lang="en-GB" sz="2000">
+                <a:solidFill>
+                  <a:srgbClr val="FFFFFF"/>
+                </a:solidFill>
+              </a:rPr>
+              <a:t>Category C: Goods Vehicle &amp; Bus</a:t>
+            </a:r>
+          </a:p>
+          <a:p>
+            <a:r>
+              <a:rPr lang="en-GB" sz="2000">
+                <a:solidFill>
+                  <a:srgbClr val="FFFFFF"/>
+                </a:solidFill>
+              </a:rPr>
+              <a:t>Category D: Motorcycle</a:t>
+            </a:r>
+          </a:p>
+          <a:p>
+            <a:r>
+              <a:rPr lang="en-GB" sz="2000">
+                <a:solidFill>
+                  <a:srgbClr val="FFFFFF"/>
+                </a:solidFill>
+              </a:rPr>
+              <a:t>Category E: Open</a:t>
             </a:r>
           </a:p>
         </p:txBody>
       </p:sp>
       <p:pic>
         <p:nvPicPr>
-          <p:cNvPr id="5122" name="Picture 2">
-            <a:extLst>
-              <a:ext uri="{FF2B5EF4-FFF2-40B4-BE49-F238E27FC236}">
-                <a16:creationId xmlns:a16="http://schemas.microsoft.com/office/drawing/2014/main" id="{BE991F8B-859D-4AEE-9DFB-EE674A97C087}"/>
+          <p:cNvPr id="5" name="Content Placeholder 4">
+            <a:extLst>
+              <a:ext uri="{FF2B5EF4-FFF2-40B4-BE49-F238E27FC236}">
+                <a16:creationId xmlns:a16="http://schemas.microsoft.com/office/drawing/2014/main" id="{96D9773B-A7B8-4A8C-BC41-02F3EE6914C5}"/>
               </a:ext>
             </a:extLst>
           </p:cNvPr>
           <p:cNvPicPr>
-            <a:picLocks noChangeAspect="1" noChangeArrowheads="1"/>
+            <a:picLocks noChangeAspect="1"/>
           </p:cNvPicPr>
           <p:nvPr/>
         </p:nvPicPr>
         <p:blipFill>
-          <a:blip r:embed="rId2">
-            <a:extLst>
-              <a:ext uri="{28A0092B-C50C-407E-A947-70E740481C1C}">
-                <a14:useLocalDpi xmlns:a14="http://schemas.microsoft.com/office/drawing/2010/main" val="0"/>
-              </a:ext>
-            </a:extLst>
-          </a:blip>
+          <a:blip r:embed="rId2"/>
           <a:stretch>
             <a:fillRect/>
           </a:stretch>
         </p:blipFill>
-        <p:spPr bwMode="auto">
+        <p:spPr>
           <a:xfrm>
-            <a:off x="4276344" y="1579946"/>
-            <a:ext cx="7251192" cy="3698107"/>
-          </a:xfrm>
-          <a:prstGeom prst="rect">
+            <a:off x="6585028" y="4342410"/>
+            <a:ext cx="5424795" cy="2150465"/>
+          </a:xfrm>
+          <a:custGeom>
             <a:avLst/>
-          </a:prstGeom>
-          <a:noFill/>
-          <a:extLst>
-            <a:ext uri="{909E8E84-426E-40DD-AFC4-6F175D3DCCD1}">
-              <a14:hiddenFill xmlns:a14="http://schemas.microsoft.com/office/drawing/2010/main">
-                <a:solidFill>
-                  <a:srgbClr val="FFFFFF"/>
-                </a:solidFill>
-              </a14:hiddenFill>
-            </a:ext>
-          </a:extLst>
+            <a:gdLst>
+              <a:gd name="connsiteX0" fmla="*/ 0 w 4636009"/>
+              <a:gd name="connsiteY0" fmla="*/ 0 h 5032375"/>
+              <a:gd name="connsiteX1" fmla="*/ 4636009 w 4636009"/>
+              <a:gd name="connsiteY1" fmla="*/ 0 h 5032375"/>
+              <a:gd name="connsiteX2" fmla="*/ 4636009 w 4636009"/>
+              <a:gd name="connsiteY2" fmla="*/ 5032375 h 5032375"/>
+              <a:gd name="connsiteX3" fmla="*/ 0 w 4636009"/>
+              <a:gd name="connsiteY3" fmla="*/ 5032375 h 5032375"/>
+            </a:gdLst>
+            <a:ahLst/>
+            <a:cxnLst>
+              <a:cxn ang="0">
+                <a:pos x="connsiteX0" y="connsiteY0"/>
+              </a:cxn>
+              <a:cxn ang="0">
+                <a:pos x="connsiteX1" y="connsiteY1"/>
+              </a:cxn>
+              <a:cxn ang="0">
+                <a:pos x="connsiteX2" y="connsiteY2"/>
+              </a:cxn>
+              <a:cxn ang="0">
+                <a:pos x="connsiteX3" y="connsiteY3"/>
+              </a:cxn>
+            </a:cxnLst>
+            <a:rect l="l" t="t" r="r" b="b"/>
+            <a:pathLst>
+              <a:path w="4636009" h="5032375">
+                <a:moveTo>
+                  <a:pt x="0" y="0"/>
+                </a:moveTo>
+                <a:lnTo>
+                  <a:pt x="4636009" y="0"/>
+                </a:lnTo>
+                <a:lnTo>
+                  <a:pt x="4636009" y="5032375"/>
+                </a:lnTo>
+                <a:lnTo>
+                  <a:pt x="0" y="5032375"/>
+                </a:lnTo>
+                <a:close/>
+              </a:path>
+            </a:pathLst>
+          </a:custGeom>
+        </p:spPr>
+      </p:pic>
+      <p:pic>
+        <p:nvPicPr>
+          <p:cNvPr id="6" name="Picture 5">
+            <a:extLst>
+              <a:ext uri="{FF2B5EF4-FFF2-40B4-BE49-F238E27FC236}">
+                <a16:creationId xmlns:a16="http://schemas.microsoft.com/office/drawing/2014/main" id="{3DC03E8C-1573-49B8-8FE1-D1FA23D4B06E}"/>
+              </a:ext>
+            </a:extLst>
+          </p:cNvPr>
+          <p:cNvPicPr>
+            <a:picLocks noChangeAspect="1"/>
+          </p:cNvPicPr>
+          <p:nvPr/>
+        </p:nvPicPr>
+        <p:blipFill>
+          <a:blip r:embed="rId3"/>
+          <a:stretch>
+            <a:fillRect/>
+          </a:stretch>
+        </p:blipFill>
+        <p:spPr>
+          <a:xfrm>
+            <a:off x="7753437" y="2428461"/>
+            <a:ext cx="4256386" cy="984375"/>
+          </a:xfrm>
+          <a:custGeom>
+            <a:avLst/>
+            <a:gdLst>
+              <a:gd name="connsiteX0" fmla="*/ 0 w 4636009"/>
+              <a:gd name="connsiteY0" fmla="*/ 0 h 5032375"/>
+              <a:gd name="connsiteX1" fmla="*/ 4636009 w 4636009"/>
+              <a:gd name="connsiteY1" fmla="*/ 0 h 5032375"/>
+              <a:gd name="connsiteX2" fmla="*/ 4636009 w 4636009"/>
+              <a:gd name="connsiteY2" fmla="*/ 5032375 h 5032375"/>
+              <a:gd name="connsiteX3" fmla="*/ 0 w 4636009"/>
+              <a:gd name="connsiteY3" fmla="*/ 5032375 h 5032375"/>
+            </a:gdLst>
+            <a:ahLst/>
+            <a:cxnLst>
+              <a:cxn ang="0">
+                <a:pos x="connsiteX0" y="connsiteY0"/>
+              </a:cxn>
+              <a:cxn ang="0">
+                <a:pos x="connsiteX1" y="connsiteY1"/>
+              </a:cxn>
+              <a:cxn ang="0">
+                <a:pos x="connsiteX2" y="connsiteY2"/>
+              </a:cxn>
+              <a:cxn ang="0">
+                <a:pos x="connsiteX3" y="connsiteY3"/>
+              </a:cxn>
+            </a:cxnLst>
+            <a:rect l="l" t="t" r="r" b="b"/>
+            <a:pathLst>
+              <a:path w="4636009" h="5032375">
+                <a:moveTo>
+                  <a:pt x="0" y="0"/>
+                </a:moveTo>
+                <a:lnTo>
+                  <a:pt x="4636009" y="0"/>
+                </a:lnTo>
+                <a:lnTo>
+                  <a:pt x="4636009" y="5032375"/>
+                </a:lnTo>
+                <a:lnTo>
+                  <a:pt x="0" y="5032375"/>
+                </a:lnTo>
+                <a:close/>
+              </a:path>
+            </a:pathLst>
+          </a:custGeom>
         </p:spPr>
       </p:pic>
     </p:spTree>
     <p:extLst>
       <p:ext uri="{BB962C8B-B14F-4D97-AF65-F5344CB8AC3E}">
-        <p14:creationId xmlns:p14="http://schemas.microsoft.com/office/powerpoint/2010/main" val="2465704969"/>
+        <p14:creationId xmlns:p14="http://schemas.microsoft.com/office/powerpoint/2010/main" val="398218947"/>
       </p:ext>
     </p:extLst>
   </p:cSld>
@@ -3793,14 +4659,6 @@
 <file path=ppt/slides/slide4.xml><?xml version="1.0" encoding="utf-8"?>
 <p:sld xmlns:a="http://schemas.openxmlformats.org/drawingml/2006/main" xmlns:r="http://schemas.openxmlformats.org/officeDocument/2006/relationships" xmlns:p="http://schemas.openxmlformats.org/presentationml/2006/main">
   <p:cSld>
-    <p:bg>
-      <p:bgPr>
-        <a:solidFill>
-          <a:schemeClr val="bg1"/>
-        </a:solidFill>
-        <a:effectLst/>
-      </p:bgPr>
-    </p:bg>
     <p:spTree>
       <p:nvGrpSpPr>
         <p:cNvPr id="1" name=""/>
@@ -3820,7 +4678,7 @@
           <p:cNvPr id="2" name="Title 1">
             <a:extLst>
               <a:ext uri="{FF2B5EF4-FFF2-40B4-BE49-F238E27FC236}">
-                <a16:creationId xmlns:a16="http://schemas.microsoft.com/office/drawing/2014/main" id="{4A218608-31C1-44E9-8383-CE4345C7EC42}"/>
+                <a16:creationId xmlns:a16="http://schemas.microsoft.com/office/drawing/2014/main" id="{BF110E11-5F13-41BE-91D6-8EC970333694}"/>
               </a:ext>
             </a:extLst>
           </p:cNvPr>
@@ -3831,130 +4689,114 @@
             <p:ph type="title"/>
           </p:nvPr>
         </p:nvSpPr>
+        <p:spPr/>
+        <p:txBody>
+          <a:bodyPr/>
+          <a:lstStyle/>
+          <a:p>
+            <a:r>
+              <a:rPr lang="en-SG" dirty="0"/>
+              <a:t>COE Results Dataset Preparation</a:t>
+            </a:r>
+          </a:p>
+        </p:txBody>
+      </p:sp>
+      <p:pic>
+        <p:nvPicPr>
+          <p:cNvPr id="4" name="Content Placeholder 3">
+            <a:extLst>
+              <a:ext uri="{FF2B5EF4-FFF2-40B4-BE49-F238E27FC236}">
+                <a16:creationId xmlns:a16="http://schemas.microsoft.com/office/drawing/2014/main" id="{B95D487D-D807-4C81-96A3-D4AAD062B41A}"/>
+              </a:ext>
+            </a:extLst>
+          </p:cNvPr>
+          <p:cNvPicPr>
+            <a:picLocks noGrp="1" noChangeAspect="1"/>
+          </p:cNvPicPr>
+          <p:nvPr>
+            <p:ph idx="1"/>
+          </p:nvPr>
+        </p:nvPicPr>
+        <p:blipFill>
+          <a:blip r:embed="rId2"/>
+          <a:stretch>
+            <a:fillRect/>
+          </a:stretch>
+        </p:blipFill>
         <p:spPr>
           <a:xfrm>
-            <a:off x="838200" y="640080"/>
-            <a:ext cx="2798064" cy="2304288"/>
-          </a:xfrm>
-        </p:spPr>
-        <p:txBody>
-          <a:bodyPr vert="horz" lIns="91440" tIns="45720" rIns="91440" bIns="45720" rtlCol="0" anchor="b">
-            <a:normAutofit/>
-          </a:bodyPr>
-          <a:lstStyle/>
-          <a:p>
-            <a:r>
-              <a:rPr lang="en-US" sz="3100" dirty="0"/>
-              <a:t>The Relation Between The Bids Received &amp; Category D</a:t>
-            </a:r>
-            <a:endParaRPr lang="en-US" sz="3100" kern="1200" dirty="0">
-              <a:latin typeface="+mj-lt"/>
-              <a:ea typeface="+mj-ea"/>
-              <a:cs typeface="+mj-cs"/>
-            </a:endParaRPr>
-          </a:p>
-        </p:txBody>
-      </p:sp>
-      <p:sp>
-        <p:nvSpPr>
-          <p:cNvPr id="3" name="Content Placeholder 2">
-            <a:extLst>
-              <a:ext uri="{FF2B5EF4-FFF2-40B4-BE49-F238E27FC236}">
-                <a16:creationId xmlns:a16="http://schemas.microsoft.com/office/drawing/2014/main" id="{642127CD-CBFA-4C28-BE81-324C314823B1}"/>
-              </a:ext>
-            </a:extLst>
-          </p:cNvPr>
-          <p:cNvSpPr>
-            <a:spLocks noGrp="1"/>
-          </p:cNvSpPr>
-          <p:nvPr>
-            <p:ph idx="1"/>
-          </p:nvPr>
-        </p:nvSpPr>
-        <p:spPr>
-          <a:xfrm>
-            <a:off x="838200" y="3136392"/>
-            <a:ext cx="2770632" cy="3081528"/>
-          </a:xfrm>
-        </p:spPr>
-        <p:txBody>
-          <a:bodyPr vert="horz" lIns="91440" tIns="45720" rIns="91440" bIns="45720" rtlCol="0">
-            <a:normAutofit/>
-          </a:bodyPr>
-          <a:lstStyle/>
-          <a:p>
-            <a:pPr marL="285750"/>
-            <a:r>
-              <a:rPr lang="en-US" sz="1800"/>
-              <a:t>Asdasdadsa</a:t>
-            </a:r>
-          </a:p>
-          <a:p>
-            <a:pPr marL="285750"/>
-            <a:r>
-              <a:rPr lang="en-US" sz="1800"/>
-              <a:t>Asdasd</a:t>
-            </a:r>
-          </a:p>
-          <a:p>
-            <a:pPr marL="285750"/>
-            <a:r>
-              <a:rPr lang="en-US" sz="1800"/>
-              <a:t>das</a:t>
-            </a:r>
-          </a:p>
-        </p:txBody>
-      </p:sp>
+            <a:off x="1401618" y="1690688"/>
+            <a:ext cx="4214091" cy="3088409"/>
+          </a:xfrm>
+          <a:prstGeom prst="rect">
+            <a:avLst/>
+          </a:prstGeom>
+        </p:spPr>
+      </p:pic>
       <p:pic>
         <p:nvPicPr>
-          <p:cNvPr id="4098" name="Picture 2">
-            <a:extLst>
-              <a:ext uri="{FF2B5EF4-FFF2-40B4-BE49-F238E27FC236}">
-                <a16:creationId xmlns:a16="http://schemas.microsoft.com/office/drawing/2014/main" id="{DC5C0CF5-AFE8-4A55-B507-4BE25104FB63}"/>
+          <p:cNvPr id="5" name="Picture 4">
+            <a:extLst>
+              <a:ext uri="{FF2B5EF4-FFF2-40B4-BE49-F238E27FC236}">
+                <a16:creationId xmlns:a16="http://schemas.microsoft.com/office/drawing/2014/main" id="{835B518E-A6C5-4107-81C7-8B829829AA87}"/>
               </a:ext>
             </a:extLst>
           </p:cNvPr>
           <p:cNvPicPr>
-            <a:picLocks noChangeAspect="1" noChangeArrowheads="1"/>
+            <a:picLocks noChangeAspect="1"/>
           </p:cNvPicPr>
           <p:nvPr/>
         </p:nvPicPr>
         <p:blipFill>
-          <a:blip r:embed="rId2">
-            <a:extLst>
-              <a:ext uri="{28A0092B-C50C-407E-A947-70E740481C1C}">
-                <a14:useLocalDpi xmlns:a14="http://schemas.microsoft.com/office/drawing/2010/main" val="0"/>
-              </a:ext>
-            </a:extLst>
-          </a:blip>
+          <a:blip r:embed="rId3"/>
           <a:stretch>
             <a:fillRect/>
           </a:stretch>
         </p:blipFill>
-        <p:spPr bwMode="auto">
+        <p:spPr>
           <a:xfrm>
-            <a:off x="4276344" y="1579946"/>
-            <a:ext cx="7251192" cy="3698107"/>
+            <a:off x="1771073" y="4997120"/>
+            <a:ext cx="3744768" cy="1495755"/>
           </a:xfrm>
           <a:prstGeom prst="rect">
             <a:avLst/>
           </a:prstGeom>
-          <a:noFill/>
-          <a:extLst>
-            <a:ext uri="{909E8E84-426E-40DD-AFC4-6F175D3DCCD1}">
-              <a14:hiddenFill xmlns:a14="http://schemas.microsoft.com/office/drawing/2010/main">
-                <a:solidFill>
-                  <a:srgbClr val="FFFFFF"/>
-                </a:solidFill>
-              </a14:hiddenFill>
-            </a:ext>
-          </a:extLst>
+        </p:spPr>
+      </p:pic>
+      <p:pic>
+        <p:nvPicPr>
+          <p:cNvPr id="7" name="Picture 6">
+            <a:extLst>
+              <a:ext uri="{FF2B5EF4-FFF2-40B4-BE49-F238E27FC236}">
+                <a16:creationId xmlns:a16="http://schemas.microsoft.com/office/drawing/2014/main" id="{69624ED2-2840-4219-AFD2-F14EB19BD399}"/>
+              </a:ext>
+            </a:extLst>
+          </p:cNvPr>
+          <p:cNvPicPr>
+            <a:picLocks noChangeAspect="1"/>
+          </p:cNvPicPr>
+          <p:nvPr/>
+        </p:nvPicPr>
+        <p:blipFill>
+          <a:blip r:embed="rId4"/>
+          <a:stretch>
+            <a:fillRect/>
+          </a:stretch>
+        </p:blipFill>
+        <p:spPr>
+          <a:xfrm>
+            <a:off x="6096000" y="1588366"/>
+            <a:ext cx="5172075" cy="5048250"/>
+          </a:xfrm>
+          <a:prstGeom prst="rect">
+            <a:avLst/>
+          </a:prstGeom>
         </p:spPr>
       </p:pic>
     </p:spTree>
     <p:extLst>
       <p:ext uri="{BB962C8B-B14F-4D97-AF65-F5344CB8AC3E}">
-        <p14:creationId xmlns:p14="http://schemas.microsoft.com/office/powerpoint/2010/main" val="3079651743"/>
+        <p14:creationId xmlns:p14="http://schemas.microsoft.com/office/powerpoint/2010/main" val="1357581367"/>
       </p:ext>
     </p:extLst>
   </p:cSld>
@@ -3989,102 +4831,487 @@
           <a:chExt cx="0" cy="0"/>
         </a:xfrm>
       </p:grpSpPr>
-      <p:sp>
-        <p:nvSpPr>
-          <p:cNvPr id="2" name="Title 1">
-            <a:extLst>
-              <a:ext uri="{FF2B5EF4-FFF2-40B4-BE49-F238E27FC236}">
-                <a16:creationId xmlns:a16="http://schemas.microsoft.com/office/drawing/2014/main" id="{4A218608-31C1-44E9-8383-CE4345C7EC42}"/>
-              </a:ext>
-            </a:extLst>
-          </p:cNvPr>
-          <p:cNvSpPr>
-            <a:spLocks noGrp="1"/>
-          </p:cNvSpPr>
-          <p:nvPr>
-            <p:ph type="title"/>
+      <p:sp useBgFill="1">
+        <p:nvSpPr>
+          <p:cNvPr id="137" name="Rectangle 136">
+            <a:extLst>
+              <a:ext uri="{FF2B5EF4-FFF2-40B4-BE49-F238E27FC236}">
+                <a16:creationId xmlns:a16="http://schemas.microsoft.com/office/drawing/2014/main" id="{CD504B3E-2155-480C-A1E5-DBFD02C55BA6}"/>
+              </a:ext>
+              <a:ext uri="{C183D7F6-B498-43B3-948B-1728B52AA6E4}">
+                <adec:decorative xmlns:adec="http://schemas.microsoft.com/office/drawing/2017/decorative" val="1"/>
+              </a:ext>
+            </a:extLst>
+          </p:cNvPr>
+          <p:cNvSpPr>
+            <a:spLocks noGrp="1" noRot="1" noChangeAspect="1" noMove="1" noResize="1" noEditPoints="1" noAdjustHandles="1" noChangeArrowheads="1" noChangeShapeType="1" noTextEdit="1"/>
+          </p:cNvSpPr>
+          <p:nvPr>
+            <p:extLst>
+              <p:ext uri="{386F3935-93C4-4BCD-93E2-E3B085C9AB24}">
+                <p16:designElem xmlns:p16="http://schemas.microsoft.com/office/powerpoint/2015/main" val="1"/>
+              </p:ext>
+            </p:extLst>
           </p:nvPr>
         </p:nvSpPr>
         <p:spPr>
           <a:xfrm>
-            <a:off x="838200" y="640080"/>
-            <a:ext cx="2798064" cy="2304288"/>
-          </a:xfrm>
-        </p:spPr>
-        <p:txBody>
-          <a:bodyPr vert="horz" lIns="91440" tIns="45720" rIns="91440" bIns="45720" rtlCol="0" anchor="b">
+            <a:off x="0" y="0"/>
+            <a:ext cx="12192000" cy="6858000"/>
+          </a:xfrm>
+          <a:prstGeom prst="rect">
+            <a:avLst/>
+          </a:prstGeom>
+          <a:ln>
+            <a:noFill/>
+          </a:ln>
+        </p:spPr>
+        <p:style>
+          <a:lnRef idx="2">
+            <a:schemeClr val="accent1">
+              <a:shade val="50000"/>
+            </a:schemeClr>
+          </a:lnRef>
+          <a:fillRef idx="1">
+            <a:schemeClr val="accent1"/>
+          </a:fillRef>
+          <a:effectRef idx="0">
+            <a:schemeClr val="accent1"/>
+          </a:effectRef>
+          <a:fontRef idx="minor">
+            <a:schemeClr val="lt1"/>
+          </a:fontRef>
+        </p:style>
+        <p:txBody>
+          <a:bodyPr rtlCol="0" anchor="ctr"/>
+          <a:lstStyle/>
+          <a:p>
+            <a:pPr algn="ctr"/>
+            <a:endParaRPr lang="en-US"/>
+          </a:p>
+        </p:txBody>
+      </p:sp>
+      <p:sp useBgFill="1">
+        <p:nvSpPr>
+          <p:cNvPr id="139" name="Rectangle 138">
+            <a:extLst>
+              <a:ext uri="{FF2B5EF4-FFF2-40B4-BE49-F238E27FC236}">
+                <a16:creationId xmlns:a16="http://schemas.microsoft.com/office/drawing/2014/main" id="{0990C621-3B8B-4820-8328-D47EF7CE823C}"/>
+              </a:ext>
+              <a:ext uri="{C183D7F6-B498-43B3-948B-1728B52AA6E4}">
+                <adec:decorative xmlns:adec="http://schemas.microsoft.com/office/drawing/2017/decorative" val="1"/>
+              </a:ext>
+            </a:extLst>
+          </p:cNvPr>
+          <p:cNvSpPr>
+            <a:spLocks noGrp="1" noRot="1" noChangeAspect="1" noMove="1" noResize="1" noEditPoints="1" noAdjustHandles="1" noChangeArrowheads="1" noChangeShapeType="1" noTextEdit="1"/>
+          </p:cNvSpPr>
+          <p:nvPr>
+            <p:extLst>
+              <p:ext uri="{386F3935-93C4-4BCD-93E2-E3B085C9AB24}">
+                <p16:designElem xmlns:p16="http://schemas.microsoft.com/office/powerpoint/2015/main" val="1"/>
+              </p:ext>
+            </p:extLst>
+          </p:nvPr>
+        </p:nvSpPr>
+        <p:spPr>
+          <a:xfrm>
+            <a:off x="554416" y="365125"/>
+            <a:ext cx="11167447" cy="2089317"/>
+          </a:xfrm>
+          <a:prstGeom prst="rect">
+            <a:avLst/>
+          </a:prstGeom>
+          <a:ln w="12700">
+            <a:solidFill>
+              <a:srgbClr val="EFEFEF"/>
+            </a:solidFill>
+          </a:ln>
+          <a:effectLst>
+            <a:outerShdw blurRad="50800" dist="38100" dir="2700000" algn="tl" rotWithShape="0">
+              <a:schemeClr val="bg2">
+                <a:lumMod val="85000"/>
+                <a:alpha val="30000"/>
+              </a:schemeClr>
+            </a:outerShdw>
+          </a:effectLst>
+        </p:spPr>
+        <p:style>
+          <a:lnRef idx="2">
+            <a:schemeClr val="accent1">
+              <a:shade val="50000"/>
+            </a:schemeClr>
+          </a:lnRef>
+          <a:fillRef idx="1">
+            <a:schemeClr val="accent1"/>
+          </a:fillRef>
+          <a:effectRef idx="0">
+            <a:schemeClr val="accent1"/>
+          </a:effectRef>
+          <a:fontRef idx="minor">
+            <a:schemeClr val="lt1"/>
+          </a:fontRef>
+        </p:style>
+        <p:txBody>
+          <a:bodyPr rtlCol="0" anchor="ctr"/>
+          <a:lstStyle/>
+          <a:p>
+            <a:pPr marL="0" marR="0" lvl="0" indent="0" algn="ctr" defTabSz="914400" rtl="0" eaLnBrk="1" fontAlgn="auto" latinLnBrk="0" hangingPunct="1">
+              <a:lnSpc>
+                <a:spcPct val="100000"/>
+              </a:lnSpc>
+              <a:spcBef>
+                <a:spcPts val="0"/>
+              </a:spcBef>
+              <a:spcAft>
+                <a:spcPts val="0"/>
+              </a:spcAft>
+              <a:buClrTx/>
+              <a:buSzTx/>
+              <a:buFontTx/>
+              <a:buNone/>
+              <a:tabLst/>
+              <a:defRPr/>
+            </a:pPr>
+            <a:endParaRPr kumimoji="0" lang="en-US" sz="1800" b="0" i="0" u="none" strike="noStrike" kern="1200" cap="none" spc="0" normalizeH="0" baseline="0" noProof="0">
+              <a:ln>
+                <a:noFill/>
+              </a:ln>
+              <a:solidFill>
+                <a:prstClr val="white"/>
+              </a:solidFill>
+              <a:effectLst/>
+              <a:uLnTx/>
+              <a:uFillTx/>
+              <a:latin typeface="Calibri" panose="020F0502020204030204"/>
+              <a:ea typeface="+mn-ea"/>
+              <a:cs typeface="+mn-cs"/>
+            </a:endParaRPr>
+          </a:p>
+        </p:txBody>
+      </p:sp>
+      <p:sp>
+        <p:nvSpPr>
+          <p:cNvPr id="2" name="Title 1">
+            <a:extLst>
+              <a:ext uri="{FF2B5EF4-FFF2-40B4-BE49-F238E27FC236}">
+                <a16:creationId xmlns:a16="http://schemas.microsoft.com/office/drawing/2014/main" id="{4A218608-31C1-44E9-8383-CE4345C7EC42}"/>
+              </a:ext>
+            </a:extLst>
+          </p:cNvPr>
+          <p:cNvSpPr>
+            <a:spLocks noGrp="1"/>
+          </p:cNvSpPr>
+          <p:nvPr>
+            <p:ph type="title"/>
+          </p:nvPr>
+        </p:nvSpPr>
+        <p:spPr>
+          <a:xfrm>
+            <a:off x="1051560" y="586822"/>
+            <a:ext cx="3538728" cy="1645920"/>
+          </a:xfrm>
+        </p:spPr>
+        <p:txBody>
+          <a:bodyPr vert="horz" lIns="91440" tIns="45720" rIns="91440" bIns="45720" rtlCol="0" anchor="ctr">
             <a:normAutofit/>
           </a:bodyPr>
           <a:lstStyle/>
           <a:p>
             <a:r>
-              <a:rPr lang="en-US" sz="3100" dirty="0"/>
-              <a:t>The Number Of Driving Licenses In The Last Decade</a:t>
-            </a:r>
-            <a:endParaRPr lang="en-US" sz="3100" kern="1200" dirty="0">
-              <a:latin typeface="+mj-lt"/>
-              <a:ea typeface="+mj-ea"/>
-              <a:cs typeface="+mj-cs"/>
-            </a:endParaRPr>
-          </a:p>
-        </p:txBody>
-      </p:sp>
-      <p:sp>
-        <p:nvSpPr>
-          <p:cNvPr id="3" name="Content Placeholder 2">
-            <a:extLst>
-              <a:ext uri="{FF2B5EF4-FFF2-40B4-BE49-F238E27FC236}">
-                <a16:creationId xmlns:a16="http://schemas.microsoft.com/office/drawing/2014/main" id="{078334CF-3C26-4F0A-88F9-73BA5DDACA99}"/>
-              </a:ext>
-            </a:extLst>
-          </p:cNvPr>
-          <p:cNvSpPr>
-            <a:spLocks noGrp="1"/>
-          </p:cNvSpPr>
-          <p:nvPr>
-            <p:ph idx="1"/>
+              <a:rPr lang="en-US" sz="2700" kern="1200">
+                <a:solidFill>
+                  <a:schemeClr val="tx1"/>
+                </a:solidFill>
+                <a:latin typeface="+mj-lt"/>
+                <a:ea typeface="+mj-ea"/>
+                <a:cs typeface="+mj-cs"/>
+              </a:rPr>
+              <a:t>Price Difference Between The Months From 2015 to 2018 For Category A</a:t>
+            </a:r>
+          </a:p>
+        </p:txBody>
+      </p:sp>
+      <p:sp>
+        <p:nvSpPr>
+          <p:cNvPr id="2057" name="Rectangle 140">
+            <a:extLst>
+              <a:ext uri="{FF2B5EF4-FFF2-40B4-BE49-F238E27FC236}">
+                <a16:creationId xmlns:a16="http://schemas.microsoft.com/office/drawing/2014/main" id="{C1A2385B-1D2A-4E17-84FA-6CB7F0AAE473}"/>
+              </a:ext>
+              <a:ext uri="{C183D7F6-B498-43B3-948B-1728B52AA6E4}">
+                <adec:decorative xmlns:adec="http://schemas.microsoft.com/office/drawing/2017/decorative" val="1"/>
+              </a:ext>
+            </a:extLst>
+          </p:cNvPr>
+          <p:cNvSpPr>
+            <a:spLocks noGrp="1" noRot="1" noChangeAspect="1" noMove="1" noResize="1" noEditPoints="1" noAdjustHandles="1" noChangeArrowheads="1" noChangeShapeType="1" noTextEdit="1"/>
+          </p:cNvSpPr>
+          <p:nvPr>
+            <p:extLst>
+              <p:ext uri="{386F3935-93C4-4BCD-93E2-E3B085C9AB24}">
+                <p16:designElem xmlns:p16="http://schemas.microsoft.com/office/powerpoint/2015/main" val="1"/>
+              </p:ext>
+            </p:extLst>
           </p:nvPr>
         </p:nvSpPr>
         <p:spPr>
           <a:xfrm>
-            <a:off x="838200" y="3136392"/>
-            <a:ext cx="2770632" cy="3081528"/>
-          </a:xfrm>
-        </p:spPr>
-        <p:txBody>
-          <a:bodyPr vert="horz" lIns="91440" tIns="45720" rIns="91440" bIns="45720" rtlCol="0">
-            <a:normAutofit/>
+            <a:off x="490408" y="1057739"/>
+            <a:ext cx="128016" cy="704088"/>
+          </a:xfrm>
+          <a:prstGeom prst="rect">
+            <a:avLst/>
+          </a:prstGeom>
+          <a:solidFill>
+            <a:schemeClr val="accent2"/>
+          </a:solidFill>
+          <a:ln>
+            <a:noFill/>
+          </a:ln>
+        </p:spPr>
+        <p:style>
+          <a:lnRef idx="2">
+            <a:schemeClr val="accent1">
+              <a:shade val="50000"/>
+            </a:schemeClr>
+          </a:lnRef>
+          <a:fillRef idx="1">
+            <a:schemeClr val="accent1"/>
+          </a:fillRef>
+          <a:effectRef idx="0">
+            <a:schemeClr val="accent1"/>
+          </a:effectRef>
+          <a:fontRef idx="minor">
+            <a:schemeClr val="lt1"/>
+          </a:fontRef>
+        </p:style>
+        <p:txBody>
+          <a:bodyPr rtlCol="0" anchor="ctr"/>
+          <a:lstStyle/>
+          <a:p>
+            <a:pPr algn="ctr"/>
+            <a:endParaRPr lang="en-US" dirty="0">
+              <a:solidFill>
+                <a:prstClr val="white"/>
+              </a:solidFill>
+              <a:latin typeface="Calibri" panose="020F0502020204030204"/>
+            </a:endParaRPr>
+          </a:p>
+        </p:txBody>
+      </p:sp>
+      <p:sp>
+        <p:nvSpPr>
+          <p:cNvPr id="2058" name="Rectangle 142">
+            <a:extLst>
+              <a:ext uri="{FF2B5EF4-FFF2-40B4-BE49-F238E27FC236}">
+                <a16:creationId xmlns:a16="http://schemas.microsoft.com/office/drawing/2014/main" id="{5E791F2F-79DB-4CC0-9FA1-001E3E91E8B7}"/>
+              </a:ext>
+              <a:ext uri="{C183D7F6-B498-43B3-948B-1728B52AA6E4}">
+                <adec:decorative xmlns:adec="http://schemas.microsoft.com/office/drawing/2017/decorative" val="1"/>
+              </a:ext>
+            </a:extLst>
+          </p:cNvPr>
+          <p:cNvSpPr>
+            <a:spLocks noGrp="1" noRot="1" noChangeAspect="1" noMove="1" noResize="1" noEditPoints="1" noAdjustHandles="1" noChangeArrowheads="1" noChangeShapeType="1" noTextEdit="1"/>
+          </p:cNvSpPr>
+          <p:nvPr>
+            <p:extLst>
+              <p:ext uri="{386F3935-93C4-4BCD-93E2-E3B085C9AB24}">
+                <p16:designElem xmlns:p16="http://schemas.microsoft.com/office/powerpoint/2015/main" val="1"/>
+              </p:ext>
+            </p:extLst>
+          </p:nvPr>
+        </p:nvSpPr>
+        <p:spPr>
+          <a:xfrm rot="5400000">
+            <a:off x="4248113" y="1405210"/>
+            <a:ext cx="1463040" cy="9144"/>
+          </a:xfrm>
+          <a:prstGeom prst="rect">
+            <a:avLst/>
+          </a:prstGeom>
+          <a:solidFill>
+            <a:srgbClr val="D5D5D5"/>
+          </a:solidFill>
+          <a:ln w="3175">
+            <a:noFill/>
+          </a:ln>
+          <a:effectLst/>
+        </p:spPr>
+        <p:style>
+          <a:lnRef idx="2">
+            <a:schemeClr val="accent1">
+              <a:shade val="50000"/>
+            </a:schemeClr>
+          </a:lnRef>
+          <a:fillRef idx="1">
+            <a:schemeClr val="accent1"/>
+          </a:fillRef>
+          <a:effectRef idx="0">
+            <a:schemeClr val="accent1"/>
+          </a:effectRef>
+          <a:fontRef idx="minor">
+            <a:schemeClr val="lt1"/>
+          </a:fontRef>
+        </p:style>
+        <p:txBody>
+          <a:bodyPr rtlCol="0" anchor="ctr"/>
+          <a:lstStyle/>
+          <a:p>
+            <a:pPr marL="0" marR="0" lvl="0" indent="0" algn="ctr" defTabSz="914400" rtl="0" eaLnBrk="1" fontAlgn="auto" latinLnBrk="0" hangingPunct="1">
+              <a:lnSpc>
+                <a:spcPct val="100000"/>
+              </a:lnSpc>
+              <a:spcBef>
+                <a:spcPts val="0"/>
+              </a:spcBef>
+              <a:spcAft>
+                <a:spcPts val="0"/>
+              </a:spcAft>
+              <a:buClrTx/>
+              <a:buSzTx/>
+              <a:buFontTx/>
+              <a:buNone/>
+              <a:tabLst/>
+              <a:defRPr/>
+            </a:pPr>
+            <a:endParaRPr kumimoji="0" lang="en-US" sz="1800" b="0" i="0" u="none" strike="noStrike" kern="1200" cap="none" spc="0" normalizeH="0" baseline="0" noProof="0">
+              <a:ln>
+                <a:noFill/>
+              </a:ln>
+              <a:solidFill>
+                <a:prstClr val="white"/>
+              </a:solidFill>
+              <a:effectLst/>
+              <a:uLnTx/>
+              <a:uFillTx/>
+              <a:latin typeface="Calibri" panose="020F0502020204030204"/>
+              <a:ea typeface="+mn-ea"/>
+              <a:cs typeface="+mn-cs"/>
+            </a:endParaRPr>
+          </a:p>
+        </p:txBody>
+      </p:sp>
+      <p:sp>
+        <p:nvSpPr>
+          <p:cNvPr id="4" name="Content Placeholder 3">
+            <a:extLst>
+              <a:ext uri="{FF2B5EF4-FFF2-40B4-BE49-F238E27FC236}">
+                <a16:creationId xmlns:a16="http://schemas.microsoft.com/office/drawing/2014/main" id="{15BE711E-6779-4F95-BBFC-9AC47CB3CD54}"/>
+              </a:ext>
+            </a:extLst>
+          </p:cNvPr>
+          <p:cNvSpPr>
+            <a:spLocks noGrp="1"/>
+          </p:cNvSpPr>
+          <p:nvPr>
+            <p:ph idx="1"/>
+          </p:nvPr>
+        </p:nvSpPr>
+        <p:spPr>
+          <a:xfrm>
+            <a:off x="5349240" y="586822"/>
+            <a:ext cx="6007608" cy="1645920"/>
+          </a:xfrm>
+        </p:spPr>
+        <p:txBody>
+          <a:bodyPr vert="horz" lIns="91440" tIns="45720" rIns="91440" bIns="45720" rtlCol="0" anchor="ctr">
+            <a:normAutofit fontScale="70000" lnSpcReduction="20000"/>
           </a:bodyPr>
           <a:lstStyle/>
           <a:p>
-            <a:pPr marL="285750"/>
-            <a:r>
-              <a:rPr lang="en-US" sz="1800"/>
-              <a:t>Asdasdadsa</a:t>
-            </a:r>
-          </a:p>
-          <a:p>
-            <a:pPr marL="285750"/>
-            <a:r>
-              <a:rPr lang="en-US" sz="1800"/>
-              <a:t>Asdasd</a:t>
-            </a:r>
-          </a:p>
-          <a:p>
-            <a:pPr marL="285750"/>
-            <a:r>
-              <a:rPr lang="en-US" sz="1800"/>
-              <a:t>das</a:t>
+            <a:pPr marL="285750">
+              <a:spcAft>
+                <a:spcPts val="600"/>
+              </a:spcAft>
+            </a:pPr>
+            <a:r>
+              <a:rPr lang="en-US" sz="1800" dirty="0"/>
+              <a:t>Negative : Cheaper &amp; Positive: More Expensive</a:t>
+            </a:r>
+          </a:p>
+          <a:p>
+            <a:pPr marL="285750">
+              <a:spcAft>
+                <a:spcPts val="600"/>
+              </a:spcAft>
+            </a:pPr>
+            <a:r>
+              <a:rPr lang="en-US" sz="1800" dirty="0"/>
+              <a:t>High Volatility  </a:t>
+            </a:r>
+          </a:p>
+          <a:p>
+            <a:pPr marL="285750">
+              <a:spcAft>
+                <a:spcPts val="600"/>
+              </a:spcAft>
+            </a:pPr>
+            <a:r>
+              <a:rPr lang="en-US" sz="1800" dirty="0"/>
+              <a:t>May – Jul: 2015, 2016 &amp; 2018 Plunge</a:t>
+            </a:r>
+          </a:p>
+          <a:p>
+            <a:pPr marL="285750">
+              <a:spcAft>
+                <a:spcPts val="600"/>
+              </a:spcAft>
+            </a:pPr>
+            <a:r>
+              <a:rPr lang="en-US" sz="1800" dirty="0"/>
+              <a:t>Jun – Aug: 2015, 2016 &amp; 2018 Peak</a:t>
+            </a:r>
+          </a:p>
+          <a:p>
+            <a:pPr marL="285750">
+              <a:spcAft>
+                <a:spcPts val="600"/>
+              </a:spcAft>
+            </a:pPr>
+            <a:r>
+              <a:rPr lang="en-US" sz="1800" dirty="0"/>
+              <a:t>2017 was very unlike the past data</a:t>
             </a:r>
           </a:p>
         </p:txBody>
       </p:sp>
       <p:pic>
         <p:nvPicPr>
-          <p:cNvPr id="3078" name="Picture 6">
-            <a:extLst>
-              <a:ext uri="{FF2B5EF4-FFF2-40B4-BE49-F238E27FC236}">
-                <a16:creationId xmlns:a16="http://schemas.microsoft.com/office/drawing/2014/main" id="{72BD2DF9-9DCC-49F6-A716-A4F07B24B3FF}"/>
+          <p:cNvPr id="3" name="Picture 2">
+            <a:extLst>
+              <a:ext uri="{FF2B5EF4-FFF2-40B4-BE49-F238E27FC236}">
+                <a16:creationId xmlns:a16="http://schemas.microsoft.com/office/drawing/2014/main" id="{7ACB1B9D-3337-4D34-AEFD-32D3B6EE39D6}"/>
+              </a:ext>
+            </a:extLst>
+          </p:cNvPr>
+          <p:cNvPicPr>
+            <a:picLocks noChangeAspect="1"/>
+          </p:cNvPicPr>
+          <p:nvPr/>
+        </p:nvPicPr>
+        <p:blipFill rotWithShape="1">
+          <a:blip r:embed="rId2"/>
+          <a:srcRect r="19274" b="-4"/>
+          <a:stretch/>
+        </p:blipFill>
+        <p:spPr>
+          <a:xfrm>
+            <a:off x="554416" y="2723940"/>
+            <a:ext cx="4326599" cy="3483864"/>
+          </a:xfrm>
+          <a:prstGeom prst="rect">
+            <a:avLst/>
+          </a:prstGeom>
+        </p:spPr>
+      </p:pic>
+      <p:pic>
+        <p:nvPicPr>
+          <p:cNvPr id="6" name="Picture 6">
+            <a:extLst>
+              <a:ext uri="{FF2B5EF4-FFF2-40B4-BE49-F238E27FC236}">
+                <a16:creationId xmlns:a16="http://schemas.microsoft.com/office/drawing/2014/main" id="{3BC998EC-9B60-455D-B466-96A98DB17946}"/>
               </a:ext>
             </a:extLst>
           </p:cNvPr>
@@ -4094,21 +5321,22 @@
           <p:nvPr/>
         </p:nvPicPr>
         <p:blipFill>
-          <a:blip r:embed="rId2">
+          <a:blip r:embed="rId3">
             <a:extLst>
               <a:ext uri="{28A0092B-C50C-407E-A947-70E740481C1C}">
                 <a14:useLocalDpi xmlns:a14="http://schemas.microsoft.com/office/drawing/2010/main" val="0"/>
               </a:ext>
             </a:extLst>
           </a:blip>
+          <a:srcRect/>
           <a:stretch>
             <a:fillRect/>
           </a:stretch>
         </p:blipFill>
         <p:spPr bwMode="auto">
           <a:xfrm>
-            <a:off x="4276344" y="1598074"/>
-            <a:ext cx="7251192" cy="3661852"/>
+            <a:off x="5058553" y="2723940"/>
+            <a:ext cx="6930704" cy="3505984"/>
           </a:xfrm>
           <a:prstGeom prst="rect">
             <a:avLst/>
@@ -4125,10 +5353,40 @@
           </a:extLst>
         </p:spPr>
       </p:pic>
+      <p:pic>
+        <p:nvPicPr>
+          <p:cNvPr id="7" name="Picture 6">
+            <a:extLst>
+              <a:ext uri="{FF2B5EF4-FFF2-40B4-BE49-F238E27FC236}">
+                <a16:creationId xmlns:a16="http://schemas.microsoft.com/office/drawing/2014/main" id="{82EB5FAE-65FF-4B8A-92B9-489E8B2843B7}"/>
+              </a:ext>
+            </a:extLst>
+          </p:cNvPr>
+          <p:cNvPicPr>
+            <a:picLocks noChangeAspect="1"/>
+          </p:cNvPicPr>
+          <p:nvPr/>
+        </p:nvPicPr>
+        <p:blipFill>
+          <a:blip r:embed="rId4"/>
+          <a:stretch>
+            <a:fillRect/>
+          </a:stretch>
+        </p:blipFill>
+        <p:spPr>
+          <a:xfrm>
+            <a:off x="554416" y="6233675"/>
+            <a:ext cx="3238500" cy="619125"/>
+          </a:xfrm>
+          <a:prstGeom prst="rect">
+            <a:avLst/>
+          </a:prstGeom>
+        </p:spPr>
+      </p:pic>
     </p:spTree>
     <p:extLst>
       <p:ext uri="{BB962C8B-B14F-4D97-AF65-F5344CB8AC3E}">
-        <p14:creationId xmlns:p14="http://schemas.microsoft.com/office/powerpoint/2010/main" val="1386022858"/>
+        <p14:creationId xmlns:p14="http://schemas.microsoft.com/office/powerpoint/2010/main" val="1083457882"/>
       </p:ext>
     </p:extLst>
   </p:cSld>
@@ -4163,39 +5421,198 @@
           <a:chExt cx="0" cy="0"/>
         </a:xfrm>
       </p:grpSpPr>
-      <p:sp>
-        <p:nvSpPr>
-          <p:cNvPr id="2" name="Title 1">
-            <a:extLst>
-              <a:ext uri="{FF2B5EF4-FFF2-40B4-BE49-F238E27FC236}">
-                <a16:creationId xmlns:a16="http://schemas.microsoft.com/office/drawing/2014/main" id="{4A218608-31C1-44E9-8383-CE4345C7EC42}"/>
-              </a:ext>
-            </a:extLst>
-          </p:cNvPr>
-          <p:cNvSpPr>
-            <a:spLocks noGrp="1"/>
-          </p:cNvSpPr>
-          <p:nvPr>
-            <p:ph type="title"/>
+      <p:sp useBgFill="1">
+        <p:nvSpPr>
+          <p:cNvPr id="137" name="Rectangle 136">
+            <a:extLst>
+              <a:ext uri="{FF2B5EF4-FFF2-40B4-BE49-F238E27FC236}">
+                <a16:creationId xmlns:a16="http://schemas.microsoft.com/office/drawing/2014/main" id="{385E1BDC-A9B0-4A87-82E3-F3187F69A802}"/>
+              </a:ext>
+              <a:ext uri="{C183D7F6-B498-43B3-948B-1728B52AA6E4}">
+                <adec:decorative xmlns:adec="http://schemas.microsoft.com/office/drawing/2017/decorative" val="1"/>
+              </a:ext>
+            </a:extLst>
+          </p:cNvPr>
+          <p:cNvSpPr>
+            <a:spLocks noGrp="1" noRot="1" noChangeAspect="1" noMove="1" noResize="1" noEditPoints="1" noAdjustHandles="1" noChangeArrowheads="1" noChangeShapeType="1" noTextEdit="1"/>
+          </p:cNvSpPr>
+          <p:nvPr>
+            <p:extLst>
+              <p:ext uri="{386F3935-93C4-4BCD-93E2-E3B085C9AB24}">
+                <p16:designElem xmlns:p16="http://schemas.microsoft.com/office/powerpoint/2015/main" val="1"/>
+              </p:ext>
+            </p:extLst>
           </p:nvPr>
         </p:nvSpPr>
         <p:spPr>
           <a:xfrm>
-            <a:off x="838200" y="640080"/>
-            <a:ext cx="2798064" cy="2304288"/>
-          </a:xfrm>
-        </p:spPr>
-        <p:txBody>
-          <a:bodyPr vert="horz" lIns="91440" tIns="45720" rIns="91440" bIns="45720" rtlCol="0" anchor="b">
+            <a:off x="0" y="0"/>
+            <a:ext cx="12192000" cy="6858000"/>
+          </a:xfrm>
+          <a:prstGeom prst="rect">
+            <a:avLst/>
+          </a:prstGeom>
+          <a:ln>
+            <a:noFill/>
+          </a:ln>
+        </p:spPr>
+        <p:style>
+          <a:lnRef idx="2">
+            <a:schemeClr val="accent1">
+              <a:shade val="50000"/>
+            </a:schemeClr>
+          </a:lnRef>
+          <a:fillRef idx="1">
+            <a:schemeClr val="accent1"/>
+          </a:fillRef>
+          <a:effectRef idx="0">
+            <a:schemeClr val="accent1"/>
+          </a:effectRef>
+          <a:fontRef idx="minor">
+            <a:schemeClr val="lt1"/>
+          </a:fontRef>
+        </p:style>
+        <p:txBody>
+          <a:bodyPr rtlCol="0" anchor="ctr"/>
+          <a:lstStyle/>
+          <a:p>
+            <a:pPr algn="ctr"/>
+            <a:endParaRPr lang="en-US"/>
+          </a:p>
+        </p:txBody>
+      </p:sp>
+      <p:sp useBgFill="1">
+        <p:nvSpPr>
+          <p:cNvPr id="139" name="Rectangle 138">
+            <a:extLst>
+              <a:ext uri="{FF2B5EF4-FFF2-40B4-BE49-F238E27FC236}">
+                <a16:creationId xmlns:a16="http://schemas.microsoft.com/office/drawing/2014/main" id="{0990C621-3B8B-4820-8328-D47EF7CE823C}"/>
+              </a:ext>
+              <a:ext uri="{C183D7F6-B498-43B3-948B-1728B52AA6E4}">
+                <adec:decorative xmlns:adec="http://schemas.microsoft.com/office/drawing/2017/decorative" val="1"/>
+              </a:ext>
+            </a:extLst>
+          </p:cNvPr>
+          <p:cNvSpPr>
+            <a:spLocks noGrp="1" noRot="1" noChangeAspect="1" noMove="1" noResize="1" noEditPoints="1" noAdjustHandles="1" noChangeArrowheads="1" noChangeShapeType="1" noTextEdit="1"/>
+          </p:cNvSpPr>
+          <p:nvPr>
+            <p:extLst>
+              <p:ext uri="{386F3935-93C4-4BCD-93E2-E3B085C9AB24}">
+                <p16:designElem xmlns:p16="http://schemas.microsoft.com/office/powerpoint/2015/main" val="1"/>
+              </p:ext>
+            </p:extLst>
+          </p:nvPr>
+        </p:nvSpPr>
+        <p:spPr>
+          <a:xfrm>
+            <a:off x="554416" y="365125"/>
+            <a:ext cx="11167447" cy="2089317"/>
+          </a:xfrm>
+          <a:prstGeom prst="rect">
+            <a:avLst/>
+          </a:prstGeom>
+          <a:ln w="12700">
+            <a:solidFill>
+              <a:srgbClr val="EFEFEF"/>
+            </a:solidFill>
+          </a:ln>
+          <a:effectLst>
+            <a:outerShdw blurRad="50800" dist="38100" dir="2700000" algn="tl" rotWithShape="0">
+              <a:schemeClr val="bg2">
+                <a:lumMod val="85000"/>
+                <a:alpha val="30000"/>
+              </a:schemeClr>
+            </a:outerShdw>
+          </a:effectLst>
+        </p:spPr>
+        <p:style>
+          <a:lnRef idx="2">
+            <a:schemeClr val="accent1">
+              <a:shade val="50000"/>
+            </a:schemeClr>
+          </a:lnRef>
+          <a:fillRef idx="1">
+            <a:schemeClr val="accent1"/>
+          </a:fillRef>
+          <a:effectRef idx="0">
+            <a:schemeClr val="accent1"/>
+          </a:effectRef>
+          <a:fontRef idx="minor">
+            <a:schemeClr val="lt1"/>
+          </a:fontRef>
+        </p:style>
+        <p:txBody>
+          <a:bodyPr rtlCol="0" anchor="ctr"/>
+          <a:lstStyle/>
+          <a:p>
+            <a:pPr marL="0" marR="0" lvl="0" indent="0" algn="ctr" defTabSz="914400" rtl="0" eaLnBrk="1" fontAlgn="auto" latinLnBrk="0" hangingPunct="1">
+              <a:lnSpc>
+                <a:spcPct val="100000"/>
+              </a:lnSpc>
+              <a:spcBef>
+                <a:spcPts val="0"/>
+              </a:spcBef>
+              <a:spcAft>
+                <a:spcPts val="0"/>
+              </a:spcAft>
+              <a:buClrTx/>
+              <a:buSzTx/>
+              <a:buFontTx/>
+              <a:buNone/>
+              <a:tabLst/>
+              <a:defRPr/>
+            </a:pPr>
+            <a:endParaRPr kumimoji="0" lang="en-US" sz="1800" b="0" i="0" u="none" strike="noStrike" kern="1200" cap="none" spc="0" normalizeH="0" baseline="0" noProof="0">
+              <a:ln>
+                <a:noFill/>
+              </a:ln>
+              <a:solidFill>
+                <a:prstClr val="white"/>
+              </a:solidFill>
+              <a:effectLst/>
+              <a:uLnTx/>
+              <a:uFillTx/>
+              <a:latin typeface="Calibri" panose="020F0502020204030204"/>
+              <a:ea typeface="+mn-ea"/>
+              <a:cs typeface="+mn-cs"/>
+            </a:endParaRPr>
+          </a:p>
+        </p:txBody>
+      </p:sp>
+      <p:sp>
+        <p:nvSpPr>
+          <p:cNvPr id="2" name="Title 1">
+            <a:extLst>
+              <a:ext uri="{FF2B5EF4-FFF2-40B4-BE49-F238E27FC236}">
+                <a16:creationId xmlns:a16="http://schemas.microsoft.com/office/drawing/2014/main" id="{4A218608-31C1-44E9-8383-CE4345C7EC42}"/>
+              </a:ext>
+            </a:extLst>
+          </p:cNvPr>
+          <p:cNvSpPr>
+            <a:spLocks noGrp="1"/>
+          </p:cNvSpPr>
+          <p:nvPr>
+            <p:ph type="title"/>
+          </p:nvPr>
+        </p:nvSpPr>
+        <p:spPr>
+          <a:xfrm>
+            <a:off x="1051560" y="586822"/>
+            <a:ext cx="3657600" cy="1645920"/>
+          </a:xfrm>
+        </p:spPr>
+        <p:txBody>
+          <a:bodyPr vert="horz" lIns="91440" tIns="45720" rIns="91440" bIns="45720" rtlCol="0">
             <a:normAutofit/>
           </a:bodyPr>
           <a:lstStyle/>
           <a:p>
             <a:r>
-              <a:rPr lang="en-US" sz="3100" dirty="0"/>
-              <a:t>The Number Of Decks In Singapore's HDB Carparks</a:t>
-            </a:r>
-            <a:endParaRPr lang="en-US" sz="3100" kern="1200" dirty="0">
+              <a:rPr lang="en-US" sz="3200" dirty="0"/>
+              <a:t>The Cost Of Category B From 2015 to 2018</a:t>
+            </a:r>
+            <a:endParaRPr lang="en-US" sz="3200" kern="1200" dirty="0">
               <a:latin typeface="+mj-lt"/>
               <a:ea typeface="+mj-ea"/>
               <a:cs typeface="+mj-cs"/>
@@ -4205,60 +5622,214 @@
       </p:sp>
       <p:sp>
         <p:nvSpPr>
-          <p:cNvPr id="3" name="Content Placeholder 2">
-            <a:extLst>
-              <a:ext uri="{FF2B5EF4-FFF2-40B4-BE49-F238E27FC236}">
-                <a16:creationId xmlns:a16="http://schemas.microsoft.com/office/drawing/2014/main" id="{A6DD3B12-764D-405A-AEA8-DD9E1336EA5E}"/>
-              </a:ext>
-            </a:extLst>
-          </p:cNvPr>
-          <p:cNvSpPr>
-            <a:spLocks noGrp="1"/>
-          </p:cNvSpPr>
-          <p:nvPr>
-            <p:ph idx="1"/>
+          <p:cNvPr id="141" name="Rectangle 140">
+            <a:extLst>
+              <a:ext uri="{FF2B5EF4-FFF2-40B4-BE49-F238E27FC236}">
+                <a16:creationId xmlns:a16="http://schemas.microsoft.com/office/drawing/2014/main" id="{C1A2385B-1D2A-4E17-84FA-6CB7F0AAE473}"/>
+              </a:ext>
+              <a:ext uri="{C183D7F6-B498-43B3-948B-1728B52AA6E4}">
+                <adec:decorative xmlns:adec="http://schemas.microsoft.com/office/drawing/2017/decorative" val="1"/>
+              </a:ext>
+            </a:extLst>
+          </p:cNvPr>
+          <p:cNvSpPr>
+            <a:spLocks noGrp="1" noRot="1" noChangeAspect="1" noMove="1" noResize="1" noEditPoints="1" noAdjustHandles="1" noChangeArrowheads="1" noChangeShapeType="1" noTextEdit="1"/>
+          </p:cNvSpPr>
+          <p:nvPr>
+            <p:extLst>
+              <p:ext uri="{386F3935-93C4-4BCD-93E2-E3B085C9AB24}">
+                <p16:designElem xmlns:p16="http://schemas.microsoft.com/office/powerpoint/2015/main" val="1"/>
+              </p:ext>
+            </p:extLst>
           </p:nvPr>
         </p:nvSpPr>
         <p:spPr>
           <a:xfrm>
-            <a:off x="838200" y="3136392"/>
-            <a:ext cx="2770632" cy="3081528"/>
-          </a:xfrm>
-        </p:spPr>
-        <p:txBody>
-          <a:bodyPr vert="horz" lIns="91440" tIns="45720" rIns="91440" bIns="45720" rtlCol="0">
+            <a:off x="490408" y="1057739"/>
+            <a:ext cx="128016" cy="704088"/>
+          </a:xfrm>
+          <a:prstGeom prst="rect">
+            <a:avLst/>
+          </a:prstGeom>
+          <a:solidFill>
+            <a:schemeClr val="accent2"/>
+          </a:solidFill>
+          <a:ln>
+            <a:noFill/>
+          </a:ln>
+        </p:spPr>
+        <p:style>
+          <a:lnRef idx="2">
+            <a:schemeClr val="accent1">
+              <a:shade val="50000"/>
+            </a:schemeClr>
+          </a:lnRef>
+          <a:fillRef idx="1">
+            <a:schemeClr val="accent1"/>
+          </a:fillRef>
+          <a:effectRef idx="0">
+            <a:schemeClr val="accent1"/>
+          </a:effectRef>
+          <a:fontRef idx="minor">
+            <a:schemeClr val="lt1"/>
+          </a:fontRef>
+        </p:style>
+        <p:txBody>
+          <a:bodyPr rtlCol="0" anchor="ctr"/>
+          <a:lstStyle/>
+          <a:p>
+            <a:pPr algn="ctr"/>
+            <a:endParaRPr lang="en-US" dirty="0">
+              <a:solidFill>
+                <a:prstClr val="white"/>
+              </a:solidFill>
+              <a:latin typeface="Calibri" panose="020F0502020204030204"/>
+            </a:endParaRPr>
+          </a:p>
+        </p:txBody>
+      </p:sp>
+      <p:sp>
+        <p:nvSpPr>
+          <p:cNvPr id="143" name="Rectangle 142">
+            <a:extLst>
+              <a:ext uri="{FF2B5EF4-FFF2-40B4-BE49-F238E27FC236}">
+                <a16:creationId xmlns:a16="http://schemas.microsoft.com/office/drawing/2014/main" id="{5E791F2F-79DB-4CC0-9FA1-001E3E91E8B7}"/>
+              </a:ext>
+              <a:ext uri="{C183D7F6-B498-43B3-948B-1728B52AA6E4}">
+                <adec:decorative xmlns:adec="http://schemas.microsoft.com/office/drawing/2017/decorative" val="1"/>
+              </a:ext>
+            </a:extLst>
+          </p:cNvPr>
+          <p:cNvSpPr>
+            <a:spLocks noGrp="1" noRot="1" noChangeAspect="1" noMove="1" noResize="1" noEditPoints="1" noAdjustHandles="1" noChangeArrowheads="1" noChangeShapeType="1" noTextEdit="1"/>
+          </p:cNvSpPr>
+          <p:nvPr>
+            <p:extLst>
+              <p:ext uri="{386F3935-93C4-4BCD-93E2-E3B085C9AB24}">
+                <p16:designElem xmlns:p16="http://schemas.microsoft.com/office/powerpoint/2015/main" val="1"/>
+              </p:ext>
+            </p:extLst>
+          </p:nvPr>
+        </p:nvSpPr>
+        <p:spPr>
+          <a:xfrm rot="5400000">
+            <a:off x="4248113" y="1405210"/>
+            <a:ext cx="1463040" cy="9144"/>
+          </a:xfrm>
+          <a:prstGeom prst="rect">
+            <a:avLst/>
+          </a:prstGeom>
+          <a:solidFill>
+            <a:srgbClr val="D5D5D5"/>
+          </a:solidFill>
+          <a:ln w="3175">
+            <a:noFill/>
+          </a:ln>
+          <a:effectLst/>
+        </p:spPr>
+        <p:style>
+          <a:lnRef idx="2">
+            <a:schemeClr val="accent1">
+              <a:shade val="50000"/>
+            </a:schemeClr>
+          </a:lnRef>
+          <a:fillRef idx="1">
+            <a:schemeClr val="accent1"/>
+          </a:fillRef>
+          <a:effectRef idx="0">
+            <a:schemeClr val="accent1"/>
+          </a:effectRef>
+          <a:fontRef idx="minor">
+            <a:schemeClr val="lt1"/>
+          </a:fontRef>
+        </p:style>
+        <p:txBody>
+          <a:bodyPr rtlCol="0" anchor="ctr"/>
+          <a:lstStyle/>
+          <a:p>
+            <a:pPr marL="0" marR="0" lvl="0" indent="0" algn="ctr" defTabSz="914400" rtl="0" eaLnBrk="1" fontAlgn="auto" latinLnBrk="0" hangingPunct="1">
+              <a:lnSpc>
+                <a:spcPct val="100000"/>
+              </a:lnSpc>
+              <a:spcBef>
+                <a:spcPts val="0"/>
+              </a:spcBef>
+              <a:spcAft>
+                <a:spcPts val="0"/>
+              </a:spcAft>
+              <a:buClrTx/>
+              <a:buSzTx/>
+              <a:buFontTx/>
+              <a:buNone/>
+              <a:tabLst/>
+              <a:defRPr/>
+            </a:pPr>
+            <a:endParaRPr kumimoji="0" lang="en-US" sz="1800" b="0" i="0" u="none" strike="noStrike" kern="1200" cap="none" spc="0" normalizeH="0" baseline="0" noProof="0">
+              <a:ln>
+                <a:noFill/>
+              </a:ln>
+              <a:solidFill>
+                <a:prstClr val="white"/>
+              </a:solidFill>
+              <a:effectLst/>
+              <a:uLnTx/>
+              <a:uFillTx/>
+              <a:latin typeface="Calibri" panose="020F0502020204030204"/>
+              <a:ea typeface="+mn-ea"/>
+              <a:cs typeface="+mn-cs"/>
+            </a:endParaRPr>
+          </a:p>
+        </p:txBody>
+      </p:sp>
+      <p:sp>
+        <p:nvSpPr>
+          <p:cNvPr id="3" name="Content Placeholder 2">
+            <a:extLst>
+              <a:ext uri="{FF2B5EF4-FFF2-40B4-BE49-F238E27FC236}">
+                <a16:creationId xmlns:a16="http://schemas.microsoft.com/office/drawing/2014/main" id="{E3C6CBFA-4797-4967-970C-1917E7CEABE2}"/>
+              </a:ext>
+            </a:extLst>
+          </p:cNvPr>
+          <p:cNvSpPr>
+            <a:spLocks noGrp="1"/>
+          </p:cNvSpPr>
+          <p:nvPr>
+            <p:ph idx="1"/>
+          </p:nvPr>
+        </p:nvSpPr>
+        <p:spPr>
+          <a:xfrm>
+            <a:off x="5250106" y="586822"/>
+            <a:ext cx="6106742" cy="1645920"/>
+          </a:xfrm>
+        </p:spPr>
+        <p:txBody>
+          <a:bodyPr vert="horz" lIns="91440" tIns="45720" rIns="91440" bIns="45720" rtlCol="0" anchor="ctr">
             <a:normAutofit/>
           </a:bodyPr>
           <a:lstStyle/>
           <a:p>
             <a:pPr marL="285750"/>
             <a:r>
-              <a:rPr lang="en-US" sz="1800"/>
-              <a:t>Asdasdadsa</a:t>
+              <a:rPr lang="en-US" sz="1800" dirty="0"/>
+              <a:t>2015 Min &amp; 2016 Max is almost the same</a:t>
             </a:r>
           </a:p>
           <a:p>
             <a:pPr marL="285750"/>
             <a:r>
-              <a:rPr lang="en-US" sz="1800"/>
-              <a:t>Asdasd</a:t>
-            </a:r>
-          </a:p>
-          <a:p>
-            <a:pPr marL="285750"/>
-            <a:r>
-              <a:rPr lang="en-US" sz="1800"/>
-              <a:t>das</a:t>
+              <a:rPr lang="en-US" sz="1800" dirty="0"/>
+              <a:t>2017 Min &amp; 2018 Max is almost the same </a:t>
             </a:r>
           </a:p>
         </p:txBody>
       </p:sp>
       <p:pic>
         <p:nvPicPr>
-          <p:cNvPr id="2050" name="Picture 2">
-            <a:extLst>
-              <a:ext uri="{FF2B5EF4-FFF2-40B4-BE49-F238E27FC236}">
-                <a16:creationId xmlns:a16="http://schemas.microsoft.com/office/drawing/2014/main" id="{DE55DAD0-3FAE-4EAD-A860-6310F56F3A73}"/>
+          <p:cNvPr id="3076" name="Picture 4">
+            <a:extLst>
+              <a:ext uri="{FF2B5EF4-FFF2-40B4-BE49-F238E27FC236}">
+                <a16:creationId xmlns:a16="http://schemas.microsoft.com/office/drawing/2014/main" id="{98E03FEF-0FB0-457E-9893-9D8A7C6FCE7A}"/>
               </a:ext>
             </a:extLst>
           </p:cNvPr>
@@ -4281,8 +5852,8 @@
         </p:blipFill>
         <p:spPr bwMode="auto">
           <a:xfrm>
-            <a:off x="4276344" y="1570882"/>
-            <a:ext cx="7251192" cy="3716235"/>
+            <a:off x="5784287" y="2676139"/>
+            <a:ext cx="6278404" cy="3201985"/>
           </a:xfrm>
           <a:prstGeom prst="rect">
             <a:avLst/>
@@ -4299,10 +5870,1713 @@
           </a:extLst>
         </p:spPr>
       </p:pic>
+      <p:pic>
+        <p:nvPicPr>
+          <p:cNvPr id="5" name="Picture 4">
+            <a:extLst>
+              <a:ext uri="{FF2B5EF4-FFF2-40B4-BE49-F238E27FC236}">
+                <a16:creationId xmlns:a16="http://schemas.microsoft.com/office/drawing/2014/main" id="{93D15D48-9767-46EB-ABDF-E1FF88C3280C}"/>
+              </a:ext>
+            </a:extLst>
+          </p:cNvPr>
+          <p:cNvPicPr>
+            <a:picLocks noChangeAspect="1"/>
+          </p:cNvPicPr>
+          <p:nvPr/>
+        </p:nvPicPr>
+        <p:blipFill>
+          <a:blip r:embed="rId3"/>
+          <a:stretch>
+            <a:fillRect/>
+          </a:stretch>
+        </p:blipFill>
+        <p:spPr>
+          <a:xfrm>
+            <a:off x="554416" y="5650874"/>
+            <a:ext cx="5165863" cy="1131403"/>
+          </a:xfrm>
+          <a:prstGeom prst="rect">
+            <a:avLst/>
+          </a:prstGeom>
+        </p:spPr>
+      </p:pic>
+      <p:pic>
+        <p:nvPicPr>
+          <p:cNvPr id="6" name="Picture 5">
+            <a:extLst>
+              <a:ext uri="{FF2B5EF4-FFF2-40B4-BE49-F238E27FC236}">
+                <a16:creationId xmlns:a16="http://schemas.microsoft.com/office/drawing/2014/main" id="{6D3D47D0-9B30-4C47-9AD2-431EE0CD8F3D}"/>
+              </a:ext>
+            </a:extLst>
+          </p:cNvPr>
+          <p:cNvPicPr>
+            <a:picLocks noChangeAspect="1"/>
+          </p:cNvPicPr>
+          <p:nvPr/>
+        </p:nvPicPr>
+        <p:blipFill>
+          <a:blip r:embed="rId4"/>
+          <a:stretch>
+            <a:fillRect/>
+          </a:stretch>
+        </p:blipFill>
+        <p:spPr>
+          <a:xfrm>
+            <a:off x="691096" y="2819567"/>
+            <a:ext cx="4559010" cy="2755584"/>
+          </a:xfrm>
+          <a:prstGeom prst="rect">
+            <a:avLst/>
+          </a:prstGeom>
+        </p:spPr>
+      </p:pic>
     </p:spTree>
     <p:extLst>
       <p:ext uri="{BB962C8B-B14F-4D97-AF65-F5344CB8AC3E}">
-        <p14:creationId xmlns:p14="http://schemas.microsoft.com/office/powerpoint/2010/main" val="2080557547"/>
+        <p14:creationId xmlns:p14="http://schemas.microsoft.com/office/powerpoint/2010/main" val="2465704969"/>
+      </p:ext>
+    </p:extLst>
+  </p:cSld>
+  <p:clrMapOvr>
+    <a:masterClrMapping/>
+  </p:clrMapOvr>
+</p:sld>
+</file>
+
+<file path=ppt/slides/slide7.xml><?xml version="1.0" encoding="utf-8"?>
+<p:sld xmlns:a="http://schemas.openxmlformats.org/drawingml/2006/main" xmlns:r="http://schemas.openxmlformats.org/officeDocument/2006/relationships" xmlns:p="http://schemas.openxmlformats.org/presentationml/2006/main">
+  <p:cSld>
+    <p:bg>
+      <p:bgPr>
+        <a:solidFill>
+          <a:schemeClr val="bg1"/>
+        </a:solidFill>
+        <a:effectLst/>
+      </p:bgPr>
+    </p:bg>
+    <p:spTree>
+      <p:nvGrpSpPr>
+        <p:cNvPr id="1" name=""/>
+        <p:cNvGrpSpPr/>
+        <p:nvPr/>
+      </p:nvGrpSpPr>
+      <p:grpSpPr>
+        <a:xfrm>
+          <a:off x="0" y="0"/>
+          <a:ext cx="0" cy="0"/>
+          <a:chOff x="0" y="0"/>
+          <a:chExt cx="0" cy="0"/>
+        </a:xfrm>
+      </p:grpSpPr>
+      <p:sp useBgFill="1">
+        <p:nvSpPr>
+          <p:cNvPr id="4105" name="Rectangle 75">
+            <a:extLst>
+              <a:ext uri="{FF2B5EF4-FFF2-40B4-BE49-F238E27FC236}">
+                <a16:creationId xmlns:a16="http://schemas.microsoft.com/office/drawing/2014/main" id="{385E1BDC-A9B0-4A87-82E3-F3187F69A802}"/>
+              </a:ext>
+              <a:ext uri="{C183D7F6-B498-43B3-948B-1728B52AA6E4}">
+                <adec:decorative xmlns:adec="http://schemas.microsoft.com/office/drawing/2017/decorative" val="1"/>
+              </a:ext>
+            </a:extLst>
+          </p:cNvPr>
+          <p:cNvSpPr>
+            <a:spLocks noGrp="1" noRot="1" noChangeAspect="1" noMove="1" noResize="1" noEditPoints="1" noAdjustHandles="1" noChangeArrowheads="1" noChangeShapeType="1" noTextEdit="1"/>
+          </p:cNvSpPr>
+          <p:nvPr>
+            <p:extLst>
+              <p:ext uri="{386F3935-93C4-4BCD-93E2-E3B085C9AB24}">
+                <p16:designElem xmlns:p16="http://schemas.microsoft.com/office/powerpoint/2015/main" val="1"/>
+              </p:ext>
+            </p:extLst>
+          </p:nvPr>
+        </p:nvSpPr>
+        <p:spPr>
+          <a:xfrm>
+            <a:off x="0" y="0"/>
+            <a:ext cx="12192000" cy="6858000"/>
+          </a:xfrm>
+          <a:prstGeom prst="rect">
+            <a:avLst/>
+          </a:prstGeom>
+          <a:ln>
+            <a:noFill/>
+          </a:ln>
+        </p:spPr>
+        <p:style>
+          <a:lnRef idx="2">
+            <a:schemeClr val="accent1">
+              <a:shade val="50000"/>
+            </a:schemeClr>
+          </a:lnRef>
+          <a:fillRef idx="1">
+            <a:schemeClr val="accent1"/>
+          </a:fillRef>
+          <a:effectRef idx="0">
+            <a:schemeClr val="accent1"/>
+          </a:effectRef>
+          <a:fontRef idx="minor">
+            <a:schemeClr val="lt1"/>
+          </a:fontRef>
+        </p:style>
+        <p:txBody>
+          <a:bodyPr rtlCol="0" anchor="ctr"/>
+          <a:lstStyle/>
+          <a:p>
+            <a:pPr algn="ctr"/>
+            <a:endParaRPr lang="en-US"/>
+          </a:p>
+        </p:txBody>
+      </p:sp>
+      <p:sp useBgFill="1">
+        <p:nvSpPr>
+          <p:cNvPr id="4106" name="Rectangle 77">
+            <a:extLst>
+              <a:ext uri="{FF2B5EF4-FFF2-40B4-BE49-F238E27FC236}">
+                <a16:creationId xmlns:a16="http://schemas.microsoft.com/office/drawing/2014/main" id="{0990C621-3B8B-4820-8328-D47EF7CE823C}"/>
+              </a:ext>
+              <a:ext uri="{C183D7F6-B498-43B3-948B-1728B52AA6E4}">
+                <adec:decorative xmlns:adec="http://schemas.microsoft.com/office/drawing/2017/decorative" val="1"/>
+              </a:ext>
+            </a:extLst>
+          </p:cNvPr>
+          <p:cNvSpPr>
+            <a:spLocks noGrp="1" noRot="1" noChangeAspect="1" noMove="1" noResize="1" noEditPoints="1" noAdjustHandles="1" noChangeArrowheads="1" noChangeShapeType="1" noTextEdit="1"/>
+          </p:cNvSpPr>
+          <p:nvPr>
+            <p:extLst>
+              <p:ext uri="{386F3935-93C4-4BCD-93E2-E3B085C9AB24}">
+                <p16:designElem xmlns:p16="http://schemas.microsoft.com/office/powerpoint/2015/main" val="1"/>
+              </p:ext>
+            </p:extLst>
+          </p:nvPr>
+        </p:nvSpPr>
+        <p:spPr>
+          <a:xfrm>
+            <a:off x="554416" y="365125"/>
+            <a:ext cx="11167447" cy="2089317"/>
+          </a:xfrm>
+          <a:prstGeom prst="rect">
+            <a:avLst/>
+          </a:prstGeom>
+          <a:ln w="12700">
+            <a:solidFill>
+              <a:srgbClr val="EFEFEF"/>
+            </a:solidFill>
+          </a:ln>
+          <a:effectLst>
+            <a:outerShdw blurRad="50800" dist="38100" dir="2700000" algn="tl" rotWithShape="0">
+              <a:schemeClr val="bg2">
+                <a:lumMod val="85000"/>
+                <a:alpha val="30000"/>
+              </a:schemeClr>
+            </a:outerShdw>
+          </a:effectLst>
+        </p:spPr>
+        <p:style>
+          <a:lnRef idx="2">
+            <a:schemeClr val="accent1">
+              <a:shade val="50000"/>
+            </a:schemeClr>
+          </a:lnRef>
+          <a:fillRef idx="1">
+            <a:schemeClr val="accent1"/>
+          </a:fillRef>
+          <a:effectRef idx="0">
+            <a:schemeClr val="accent1"/>
+          </a:effectRef>
+          <a:fontRef idx="minor">
+            <a:schemeClr val="lt1"/>
+          </a:fontRef>
+        </p:style>
+        <p:txBody>
+          <a:bodyPr rtlCol="0" anchor="ctr"/>
+          <a:lstStyle/>
+          <a:p>
+            <a:pPr marL="0" marR="0" lvl="0" indent="0" algn="ctr" defTabSz="914400" rtl="0" eaLnBrk="1" fontAlgn="auto" latinLnBrk="0" hangingPunct="1">
+              <a:lnSpc>
+                <a:spcPct val="100000"/>
+              </a:lnSpc>
+              <a:spcBef>
+                <a:spcPts val="0"/>
+              </a:spcBef>
+              <a:spcAft>
+                <a:spcPts val="0"/>
+              </a:spcAft>
+              <a:buClrTx/>
+              <a:buSzTx/>
+              <a:buFontTx/>
+              <a:buNone/>
+              <a:tabLst/>
+              <a:defRPr/>
+            </a:pPr>
+            <a:endParaRPr kumimoji="0" lang="en-US" sz="1800" b="0" i="0" u="none" strike="noStrike" kern="1200" cap="none" spc="0" normalizeH="0" baseline="0" noProof="0">
+              <a:ln>
+                <a:noFill/>
+              </a:ln>
+              <a:solidFill>
+                <a:prstClr val="white"/>
+              </a:solidFill>
+              <a:effectLst/>
+              <a:uLnTx/>
+              <a:uFillTx/>
+              <a:latin typeface="Calibri" panose="020F0502020204030204"/>
+              <a:ea typeface="+mn-ea"/>
+              <a:cs typeface="+mn-cs"/>
+            </a:endParaRPr>
+          </a:p>
+        </p:txBody>
+      </p:sp>
+      <p:sp>
+        <p:nvSpPr>
+          <p:cNvPr id="2" name="Title 1">
+            <a:extLst>
+              <a:ext uri="{FF2B5EF4-FFF2-40B4-BE49-F238E27FC236}">
+                <a16:creationId xmlns:a16="http://schemas.microsoft.com/office/drawing/2014/main" id="{4A218608-31C1-44E9-8383-CE4345C7EC42}"/>
+              </a:ext>
+            </a:extLst>
+          </p:cNvPr>
+          <p:cNvSpPr>
+            <a:spLocks noGrp="1"/>
+          </p:cNvSpPr>
+          <p:nvPr>
+            <p:ph type="title"/>
+          </p:nvPr>
+        </p:nvSpPr>
+        <p:spPr>
+          <a:xfrm>
+            <a:off x="1051560" y="586822"/>
+            <a:ext cx="3657600" cy="1645920"/>
+          </a:xfrm>
+        </p:spPr>
+        <p:txBody>
+          <a:bodyPr vert="horz" lIns="91440" tIns="45720" rIns="91440" bIns="45720" rtlCol="0">
+            <a:normAutofit/>
+          </a:bodyPr>
+          <a:lstStyle/>
+          <a:p>
+            <a:r>
+              <a:rPr lang="en-US" sz="3000"/>
+              <a:t>The Relation Between The Bids Received &amp; Category D</a:t>
+            </a:r>
+            <a:endParaRPr lang="en-US" sz="3000" kern="1200">
+              <a:latin typeface="+mj-lt"/>
+              <a:ea typeface="+mj-ea"/>
+              <a:cs typeface="+mj-cs"/>
+            </a:endParaRPr>
+          </a:p>
+        </p:txBody>
+      </p:sp>
+      <p:sp>
+        <p:nvSpPr>
+          <p:cNvPr id="4107" name="Rectangle 79">
+            <a:extLst>
+              <a:ext uri="{FF2B5EF4-FFF2-40B4-BE49-F238E27FC236}">
+                <a16:creationId xmlns:a16="http://schemas.microsoft.com/office/drawing/2014/main" id="{C1A2385B-1D2A-4E17-84FA-6CB7F0AAE473}"/>
+              </a:ext>
+              <a:ext uri="{C183D7F6-B498-43B3-948B-1728B52AA6E4}">
+                <adec:decorative xmlns:adec="http://schemas.microsoft.com/office/drawing/2017/decorative" val="1"/>
+              </a:ext>
+            </a:extLst>
+          </p:cNvPr>
+          <p:cNvSpPr>
+            <a:spLocks noGrp="1" noRot="1" noChangeAspect="1" noMove="1" noResize="1" noEditPoints="1" noAdjustHandles="1" noChangeArrowheads="1" noChangeShapeType="1" noTextEdit="1"/>
+          </p:cNvSpPr>
+          <p:nvPr>
+            <p:extLst>
+              <p:ext uri="{386F3935-93C4-4BCD-93E2-E3B085C9AB24}">
+                <p16:designElem xmlns:p16="http://schemas.microsoft.com/office/powerpoint/2015/main" val="1"/>
+              </p:ext>
+            </p:extLst>
+          </p:nvPr>
+        </p:nvSpPr>
+        <p:spPr>
+          <a:xfrm>
+            <a:off x="490408" y="1057739"/>
+            <a:ext cx="128016" cy="704088"/>
+          </a:xfrm>
+          <a:prstGeom prst="rect">
+            <a:avLst/>
+          </a:prstGeom>
+          <a:solidFill>
+            <a:schemeClr val="accent2"/>
+          </a:solidFill>
+          <a:ln>
+            <a:noFill/>
+          </a:ln>
+        </p:spPr>
+        <p:style>
+          <a:lnRef idx="2">
+            <a:schemeClr val="accent1">
+              <a:shade val="50000"/>
+            </a:schemeClr>
+          </a:lnRef>
+          <a:fillRef idx="1">
+            <a:schemeClr val="accent1"/>
+          </a:fillRef>
+          <a:effectRef idx="0">
+            <a:schemeClr val="accent1"/>
+          </a:effectRef>
+          <a:fontRef idx="minor">
+            <a:schemeClr val="lt1"/>
+          </a:fontRef>
+        </p:style>
+        <p:txBody>
+          <a:bodyPr rtlCol="0" anchor="ctr"/>
+          <a:lstStyle/>
+          <a:p>
+            <a:pPr algn="ctr"/>
+            <a:endParaRPr lang="en-US" dirty="0">
+              <a:solidFill>
+                <a:prstClr val="white"/>
+              </a:solidFill>
+              <a:latin typeface="Calibri" panose="020F0502020204030204"/>
+            </a:endParaRPr>
+          </a:p>
+        </p:txBody>
+      </p:sp>
+      <p:sp>
+        <p:nvSpPr>
+          <p:cNvPr id="4108" name="Rectangle 81">
+            <a:extLst>
+              <a:ext uri="{FF2B5EF4-FFF2-40B4-BE49-F238E27FC236}">
+                <a16:creationId xmlns:a16="http://schemas.microsoft.com/office/drawing/2014/main" id="{5E791F2F-79DB-4CC0-9FA1-001E3E91E8B7}"/>
+              </a:ext>
+              <a:ext uri="{C183D7F6-B498-43B3-948B-1728B52AA6E4}">
+                <adec:decorative xmlns:adec="http://schemas.microsoft.com/office/drawing/2017/decorative" val="1"/>
+              </a:ext>
+            </a:extLst>
+          </p:cNvPr>
+          <p:cNvSpPr>
+            <a:spLocks noGrp="1" noRot="1" noChangeAspect="1" noMove="1" noResize="1" noEditPoints="1" noAdjustHandles="1" noChangeArrowheads="1" noChangeShapeType="1" noTextEdit="1"/>
+          </p:cNvSpPr>
+          <p:nvPr>
+            <p:extLst>
+              <p:ext uri="{386F3935-93C4-4BCD-93E2-E3B085C9AB24}">
+                <p16:designElem xmlns:p16="http://schemas.microsoft.com/office/powerpoint/2015/main" val="1"/>
+              </p:ext>
+            </p:extLst>
+          </p:nvPr>
+        </p:nvSpPr>
+        <p:spPr>
+          <a:xfrm rot="5400000">
+            <a:off x="4248113" y="1405210"/>
+            <a:ext cx="1463040" cy="9144"/>
+          </a:xfrm>
+          <a:prstGeom prst="rect">
+            <a:avLst/>
+          </a:prstGeom>
+          <a:solidFill>
+            <a:srgbClr val="D5D5D5"/>
+          </a:solidFill>
+          <a:ln w="3175">
+            <a:noFill/>
+          </a:ln>
+          <a:effectLst/>
+        </p:spPr>
+        <p:style>
+          <a:lnRef idx="2">
+            <a:schemeClr val="accent1">
+              <a:shade val="50000"/>
+            </a:schemeClr>
+          </a:lnRef>
+          <a:fillRef idx="1">
+            <a:schemeClr val="accent1"/>
+          </a:fillRef>
+          <a:effectRef idx="0">
+            <a:schemeClr val="accent1"/>
+          </a:effectRef>
+          <a:fontRef idx="minor">
+            <a:schemeClr val="lt1"/>
+          </a:fontRef>
+        </p:style>
+        <p:txBody>
+          <a:bodyPr rtlCol="0" anchor="ctr"/>
+          <a:lstStyle/>
+          <a:p>
+            <a:pPr marL="0" marR="0" lvl="0" indent="0" algn="ctr" defTabSz="914400" rtl="0" eaLnBrk="1" fontAlgn="auto" latinLnBrk="0" hangingPunct="1">
+              <a:lnSpc>
+                <a:spcPct val="100000"/>
+              </a:lnSpc>
+              <a:spcBef>
+                <a:spcPts val="0"/>
+              </a:spcBef>
+              <a:spcAft>
+                <a:spcPts val="0"/>
+              </a:spcAft>
+              <a:buClrTx/>
+              <a:buSzTx/>
+              <a:buFontTx/>
+              <a:buNone/>
+              <a:tabLst/>
+              <a:defRPr/>
+            </a:pPr>
+            <a:endParaRPr kumimoji="0" lang="en-US" sz="1800" b="0" i="0" u="none" strike="noStrike" kern="1200" cap="none" spc="0" normalizeH="0" baseline="0" noProof="0">
+              <a:ln>
+                <a:noFill/>
+              </a:ln>
+              <a:solidFill>
+                <a:prstClr val="white"/>
+              </a:solidFill>
+              <a:effectLst/>
+              <a:uLnTx/>
+              <a:uFillTx/>
+              <a:latin typeface="Calibri" panose="020F0502020204030204"/>
+              <a:ea typeface="+mn-ea"/>
+              <a:cs typeface="+mn-cs"/>
+            </a:endParaRPr>
+          </a:p>
+        </p:txBody>
+      </p:sp>
+      <p:sp>
+        <p:nvSpPr>
+          <p:cNvPr id="3" name="Content Placeholder 2">
+            <a:extLst>
+              <a:ext uri="{FF2B5EF4-FFF2-40B4-BE49-F238E27FC236}">
+                <a16:creationId xmlns:a16="http://schemas.microsoft.com/office/drawing/2014/main" id="{642127CD-CBFA-4C28-BE81-324C314823B1}"/>
+              </a:ext>
+            </a:extLst>
+          </p:cNvPr>
+          <p:cNvSpPr>
+            <a:spLocks noGrp="1"/>
+          </p:cNvSpPr>
+          <p:nvPr>
+            <p:ph idx="1"/>
+          </p:nvPr>
+        </p:nvSpPr>
+        <p:spPr>
+          <a:xfrm>
+            <a:off x="5250106" y="586822"/>
+            <a:ext cx="6106742" cy="1645920"/>
+          </a:xfrm>
+        </p:spPr>
+        <p:txBody>
+          <a:bodyPr vert="horz" lIns="91440" tIns="45720" rIns="91440" bIns="45720" rtlCol="0" anchor="ctr">
+            <a:normAutofit/>
+          </a:bodyPr>
+          <a:lstStyle/>
+          <a:p>
+            <a:pPr marL="285750"/>
+            <a:r>
+              <a:rPr lang="en-US" sz="1800" dirty="0"/>
+              <a:t>Negative Gradient, Harsh Decline</a:t>
+            </a:r>
+          </a:p>
+          <a:p>
+            <a:pPr marL="285750"/>
+            <a:r>
+              <a:rPr lang="en-US" sz="1800" dirty="0"/>
+              <a:t>2 Outliers</a:t>
+            </a:r>
+          </a:p>
+          <a:p>
+            <a:pPr marL="285750"/>
+            <a:r>
+              <a:rPr lang="en-US" sz="1800" dirty="0"/>
+              <a:t>Lower Bids = Higher COE Price</a:t>
+            </a:r>
+          </a:p>
+          <a:p>
+            <a:pPr marL="57150" indent="0">
+              <a:buNone/>
+            </a:pPr>
+            <a:r>
+              <a:rPr lang="en-US" sz="1800" dirty="0"/>
+              <a:t> </a:t>
+            </a:r>
+          </a:p>
+          <a:p>
+            <a:pPr marL="285750"/>
+            <a:endParaRPr lang="en-US" sz="1800" dirty="0"/>
+          </a:p>
+        </p:txBody>
+      </p:sp>
+      <p:pic>
+        <p:nvPicPr>
+          <p:cNvPr id="4098" name="Picture 2">
+            <a:extLst>
+              <a:ext uri="{FF2B5EF4-FFF2-40B4-BE49-F238E27FC236}">
+                <a16:creationId xmlns:a16="http://schemas.microsoft.com/office/drawing/2014/main" id="{DC5C0CF5-AFE8-4A55-B507-4BE25104FB63}"/>
+              </a:ext>
+            </a:extLst>
+          </p:cNvPr>
+          <p:cNvPicPr>
+            <a:picLocks noChangeAspect="1" noChangeArrowheads="1"/>
+          </p:cNvPicPr>
+          <p:nvPr/>
+        </p:nvPicPr>
+        <p:blipFill>
+          <a:blip r:embed="rId2">
+            <a:extLst>
+              <a:ext uri="{28A0092B-C50C-407E-A947-70E740481C1C}">
+                <a14:useLocalDpi xmlns:a14="http://schemas.microsoft.com/office/drawing/2010/main" val="0"/>
+              </a:ext>
+            </a:extLst>
+          </a:blip>
+          <a:stretch>
+            <a:fillRect/>
+          </a:stretch>
+        </p:blipFill>
+        <p:spPr bwMode="auto">
+          <a:xfrm>
+            <a:off x="5099904" y="2925356"/>
+            <a:ext cx="6767868" cy="3451611"/>
+          </a:xfrm>
+          <a:prstGeom prst="rect">
+            <a:avLst/>
+          </a:prstGeom>
+          <a:noFill/>
+          <a:extLst>
+            <a:ext uri="{909E8E84-426E-40DD-AFC4-6F175D3DCCD1}">
+              <a14:hiddenFill xmlns:a14="http://schemas.microsoft.com/office/drawing/2010/main">
+                <a:solidFill>
+                  <a:srgbClr val="FFFFFF"/>
+                </a:solidFill>
+              </a14:hiddenFill>
+            </a:ext>
+          </a:extLst>
+        </p:spPr>
+      </p:pic>
+      <p:pic>
+        <p:nvPicPr>
+          <p:cNvPr id="5" name="Picture 4">
+            <a:extLst>
+              <a:ext uri="{FF2B5EF4-FFF2-40B4-BE49-F238E27FC236}">
+                <a16:creationId xmlns:a16="http://schemas.microsoft.com/office/drawing/2014/main" id="{DDDE4D9A-01B2-4EF5-A722-36874FDAE3E9}"/>
+              </a:ext>
+            </a:extLst>
+          </p:cNvPr>
+          <p:cNvPicPr>
+            <a:picLocks noChangeAspect="1"/>
+          </p:cNvPicPr>
+          <p:nvPr/>
+        </p:nvPicPr>
+        <p:blipFill>
+          <a:blip r:embed="rId3"/>
+          <a:stretch>
+            <a:fillRect/>
+          </a:stretch>
+        </p:blipFill>
+        <p:spPr>
+          <a:xfrm>
+            <a:off x="144890" y="5304217"/>
+            <a:ext cx="4810125" cy="276225"/>
+          </a:xfrm>
+          <a:prstGeom prst="rect">
+            <a:avLst/>
+          </a:prstGeom>
+        </p:spPr>
+      </p:pic>
+      <p:pic>
+        <p:nvPicPr>
+          <p:cNvPr id="6" name="Picture 5">
+            <a:extLst>
+              <a:ext uri="{FF2B5EF4-FFF2-40B4-BE49-F238E27FC236}">
+                <a16:creationId xmlns:a16="http://schemas.microsoft.com/office/drawing/2014/main" id="{1AC780F6-0897-4E26-9119-EDE6F8393324}"/>
+              </a:ext>
+            </a:extLst>
+          </p:cNvPr>
+          <p:cNvPicPr>
+            <a:picLocks noChangeAspect="1"/>
+          </p:cNvPicPr>
+          <p:nvPr/>
+        </p:nvPicPr>
+        <p:blipFill>
+          <a:blip r:embed="rId4"/>
+          <a:stretch>
+            <a:fillRect/>
+          </a:stretch>
+        </p:blipFill>
+        <p:spPr>
+          <a:xfrm>
+            <a:off x="172105" y="2925097"/>
+            <a:ext cx="4810125" cy="1919861"/>
+          </a:xfrm>
+          <a:prstGeom prst="rect">
+            <a:avLst/>
+          </a:prstGeom>
+        </p:spPr>
+      </p:pic>
+    </p:spTree>
+    <p:extLst>
+      <p:ext uri="{BB962C8B-B14F-4D97-AF65-F5344CB8AC3E}">
+        <p14:creationId xmlns:p14="http://schemas.microsoft.com/office/powerpoint/2010/main" val="3079651743"/>
+      </p:ext>
+    </p:extLst>
+  </p:cSld>
+  <p:clrMapOvr>
+    <a:masterClrMapping/>
+  </p:clrMapOvr>
+</p:sld>
+</file>
+
+<file path=ppt/slides/slide8.xml><?xml version="1.0" encoding="utf-8"?>
+<p:sld xmlns:a="http://schemas.openxmlformats.org/drawingml/2006/main" xmlns:r="http://schemas.openxmlformats.org/officeDocument/2006/relationships" xmlns:p="http://schemas.openxmlformats.org/presentationml/2006/main">
+  <p:cSld>
+    <p:bg>
+      <p:bgPr>
+        <a:solidFill>
+          <a:schemeClr val="bg1"/>
+        </a:solidFill>
+        <a:effectLst/>
+      </p:bgPr>
+    </p:bg>
+    <p:spTree>
+      <p:nvGrpSpPr>
+        <p:cNvPr id="1" name=""/>
+        <p:cNvGrpSpPr/>
+        <p:nvPr/>
+      </p:nvGrpSpPr>
+      <p:grpSpPr>
+        <a:xfrm>
+          <a:off x="0" y="0"/>
+          <a:ext cx="0" cy="0"/>
+          <a:chOff x="0" y="0"/>
+          <a:chExt cx="0" cy="0"/>
+        </a:xfrm>
+      </p:grpSpPr>
+      <p:sp>
+        <p:nvSpPr>
+          <p:cNvPr id="13" name="Freeform 11">
+            <a:extLst>
+              <a:ext uri="{FF2B5EF4-FFF2-40B4-BE49-F238E27FC236}">
+                <a16:creationId xmlns:a16="http://schemas.microsoft.com/office/drawing/2014/main" id="{A0BF428C-DA8B-4D99-9930-18F7F91D873D}"/>
+              </a:ext>
+              <a:ext uri="{C183D7F6-B498-43B3-948B-1728B52AA6E4}">
+                <adec:decorative xmlns:adec="http://schemas.microsoft.com/office/drawing/2017/decorative" val="1"/>
+              </a:ext>
+            </a:extLst>
+          </p:cNvPr>
+          <p:cNvSpPr>
+            <a:spLocks noGrp="1" noRot="1" noChangeAspect="1" noMove="1" noResize="1" noEditPoints="1" noAdjustHandles="1" noChangeArrowheads="1" noChangeShapeType="1" noTextEdit="1"/>
+          </p:cNvSpPr>
+          <p:nvPr>
+            <p:extLst>
+              <p:ext uri="{386F3935-93C4-4BCD-93E2-E3B085C9AB24}">
+                <p16:designElem xmlns:p16="http://schemas.microsoft.com/office/powerpoint/2015/main" val="1"/>
+              </p:ext>
+            </p:extLst>
+          </p:nvPr>
+        </p:nvSpPr>
+        <p:spPr>
+          <a:xfrm>
+            <a:off x="4876801" y="1690688"/>
+            <a:ext cx="7316944" cy="5167312"/>
+          </a:xfrm>
+          <a:custGeom>
+            <a:avLst/>
+            <a:gdLst>
+              <a:gd name="connsiteX0" fmla="*/ 0 w 7316944"/>
+              <a:gd name="connsiteY0" fmla="*/ 0 h 5167312"/>
+              <a:gd name="connsiteX1" fmla="*/ 7316944 w 7316944"/>
+              <a:gd name="connsiteY1" fmla="*/ 0 h 5167312"/>
+              <a:gd name="connsiteX2" fmla="*/ 7316944 w 7316944"/>
+              <a:gd name="connsiteY2" fmla="*/ 5167312 h 5167312"/>
+              <a:gd name="connsiteX3" fmla="*/ 472697 w 7316944"/>
+              <a:gd name="connsiteY3" fmla="*/ 5167312 h 5167312"/>
+              <a:gd name="connsiteX4" fmla="*/ 2866576 w 7316944"/>
+              <a:gd name="connsiteY4" fmla="*/ 952 h 5167312"/>
+              <a:gd name="connsiteX5" fmla="*/ 0 w 7316944"/>
+              <a:gd name="connsiteY5" fmla="*/ 952 h 5167312"/>
+            </a:gdLst>
+            <a:ahLst/>
+            <a:cxnLst>
+              <a:cxn ang="0">
+                <a:pos x="connsiteX0" y="connsiteY0"/>
+              </a:cxn>
+              <a:cxn ang="0">
+                <a:pos x="connsiteX1" y="connsiteY1"/>
+              </a:cxn>
+              <a:cxn ang="0">
+                <a:pos x="connsiteX2" y="connsiteY2"/>
+              </a:cxn>
+              <a:cxn ang="0">
+                <a:pos x="connsiteX3" y="connsiteY3"/>
+              </a:cxn>
+              <a:cxn ang="0">
+                <a:pos x="connsiteX4" y="connsiteY4"/>
+              </a:cxn>
+              <a:cxn ang="0">
+                <a:pos x="connsiteX5" y="connsiteY5"/>
+              </a:cxn>
+            </a:cxnLst>
+            <a:rect l="l" t="t" r="r" b="b"/>
+            <a:pathLst>
+              <a:path w="7316944" h="5167312">
+                <a:moveTo>
+                  <a:pt x="0" y="0"/>
+                </a:moveTo>
+                <a:lnTo>
+                  <a:pt x="7316944" y="0"/>
+                </a:lnTo>
+                <a:lnTo>
+                  <a:pt x="7316944" y="5167312"/>
+                </a:lnTo>
+                <a:lnTo>
+                  <a:pt x="472697" y="5167312"/>
+                </a:lnTo>
+                <a:lnTo>
+                  <a:pt x="2866576" y="952"/>
+                </a:lnTo>
+                <a:lnTo>
+                  <a:pt x="0" y="952"/>
+                </a:lnTo>
+                <a:close/>
+              </a:path>
+            </a:pathLst>
+          </a:custGeom>
+          <a:solidFill>
+            <a:srgbClr val="A6A6A6">
+              <a:alpha val="70000"/>
+            </a:srgbClr>
+          </a:solidFill>
+          <a:ln>
+            <a:noFill/>
+          </a:ln>
+        </p:spPr>
+        <p:style>
+          <a:lnRef idx="2">
+            <a:schemeClr val="accent1">
+              <a:shade val="50000"/>
+            </a:schemeClr>
+          </a:lnRef>
+          <a:fillRef idx="1">
+            <a:schemeClr val="accent1"/>
+          </a:fillRef>
+          <a:effectRef idx="0">
+            <a:schemeClr val="accent1"/>
+          </a:effectRef>
+          <a:fontRef idx="minor">
+            <a:schemeClr val="lt1"/>
+          </a:fontRef>
+        </p:style>
+        <p:txBody>
+          <a:bodyPr wrap="square" rtlCol="0" anchor="ctr">
+            <a:noAutofit/>
+          </a:bodyPr>
+          <a:lstStyle/>
+          <a:p>
+            <a:pPr algn="ctr"/>
+            <a:endParaRPr lang="en-US"/>
+          </a:p>
+        </p:txBody>
+      </p:sp>
+      <p:sp>
+        <p:nvSpPr>
+          <p:cNvPr id="15" name="Freeform 37">
+            <a:extLst>
+              <a:ext uri="{FF2B5EF4-FFF2-40B4-BE49-F238E27FC236}">
+                <a16:creationId xmlns:a16="http://schemas.microsoft.com/office/drawing/2014/main" id="{A03E2379-8871-408A-95CE-7AAE8FA53AE5}"/>
+              </a:ext>
+              <a:ext uri="{C183D7F6-B498-43B3-948B-1728B52AA6E4}">
+                <adec:decorative xmlns:adec="http://schemas.microsoft.com/office/drawing/2017/decorative" val="1"/>
+              </a:ext>
+            </a:extLst>
+          </p:cNvPr>
+          <p:cNvSpPr>
+            <a:spLocks noGrp="1" noRot="1" noChangeAspect="1" noMove="1" noResize="1" noEditPoints="1" noAdjustHandles="1" noChangeArrowheads="1" noChangeShapeType="1" noTextEdit="1"/>
+          </p:cNvSpPr>
+          <p:nvPr>
+            <p:extLst>
+              <p:ext uri="{386F3935-93C4-4BCD-93E2-E3B085C9AB24}">
+                <p16:designElem xmlns:p16="http://schemas.microsoft.com/office/powerpoint/2015/main" val="1"/>
+              </p:ext>
+            </p:extLst>
+          </p:nvPr>
+        </p:nvSpPr>
+        <p:spPr>
+          <a:xfrm flipV="1">
+            <a:off x="-1746" y="1691164"/>
+            <a:ext cx="7571262" cy="5166360"/>
+          </a:xfrm>
+          <a:custGeom>
+            <a:avLst/>
+            <a:gdLst>
+              <a:gd name="connsiteX0" fmla="*/ 0 w 7571262"/>
+              <a:gd name="connsiteY0" fmla="*/ 5166360 h 5166360"/>
+              <a:gd name="connsiteX1" fmla="*/ 7571262 w 7571262"/>
+              <a:gd name="connsiteY1" fmla="*/ 5166360 h 5166360"/>
+              <a:gd name="connsiteX2" fmla="*/ 5177382 w 7571262"/>
+              <a:gd name="connsiteY2" fmla="*/ 0 h 5166360"/>
+              <a:gd name="connsiteX3" fmla="*/ 5171159 w 7571262"/>
+              <a:gd name="connsiteY3" fmla="*/ 0 h 5166360"/>
+              <a:gd name="connsiteX4" fmla="*/ 3981368 w 7571262"/>
+              <a:gd name="connsiteY4" fmla="*/ 0 h 5166360"/>
+              <a:gd name="connsiteX5" fmla="*/ 2331323 w 7571262"/>
+              <a:gd name="connsiteY5" fmla="*/ 0 h 5166360"/>
+              <a:gd name="connsiteX6" fmla="*/ 0 w 7571262"/>
+              <a:gd name="connsiteY6" fmla="*/ 0 h 5166360"/>
+            </a:gdLst>
+            <a:ahLst/>
+            <a:cxnLst>
+              <a:cxn ang="0">
+                <a:pos x="connsiteX0" y="connsiteY0"/>
+              </a:cxn>
+              <a:cxn ang="0">
+                <a:pos x="connsiteX1" y="connsiteY1"/>
+              </a:cxn>
+              <a:cxn ang="0">
+                <a:pos x="connsiteX2" y="connsiteY2"/>
+              </a:cxn>
+              <a:cxn ang="0">
+                <a:pos x="connsiteX3" y="connsiteY3"/>
+              </a:cxn>
+              <a:cxn ang="0">
+                <a:pos x="connsiteX4" y="connsiteY4"/>
+              </a:cxn>
+              <a:cxn ang="0">
+                <a:pos x="connsiteX5" y="connsiteY5"/>
+              </a:cxn>
+              <a:cxn ang="0">
+                <a:pos x="connsiteX6" y="connsiteY6"/>
+              </a:cxn>
+            </a:cxnLst>
+            <a:rect l="l" t="t" r="r" b="b"/>
+            <a:pathLst>
+              <a:path w="7571262" h="5166360">
+                <a:moveTo>
+                  <a:pt x="0" y="5166360"/>
+                </a:moveTo>
+                <a:lnTo>
+                  <a:pt x="7571262" y="5166360"/>
+                </a:lnTo>
+                <a:lnTo>
+                  <a:pt x="5177382" y="0"/>
+                </a:lnTo>
+                <a:lnTo>
+                  <a:pt x="5171159" y="0"/>
+                </a:lnTo>
+                <a:lnTo>
+                  <a:pt x="3981368" y="0"/>
+                </a:lnTo>
+                <a:lnTo>
+                  <a:pt x="2331323" y="0"/>
+                </a:lnTo>
+                <a:lnTo>
+                  <a:pt x="0" y="0"/>
+                </a:lnTo>
+                <a:close/>
+              </a:path>
+            </a:pathLst>
+          </a:custGeom>
+          <a:solidFill>
+            <a:srgbClr val="404040"/>
+          </a:solidFill>
+          <a:ln>
+            <a:noFill/>
+          </a:ln>
+        </p:spPr>
+        <p:style>
+          <a:lnRef idx="2">
+            <a:schemeClr val="accent1">
+              <a:shade val="50000"/>
+            </a:schemeClr>
+          </a:lnRef>
+          <a:fillRef idx="1">
+            <a:schemeClr val="accent1"/>
+          </a:fillRef>
+          <a:effectRef idx="0">
+            <a:schemeClr val="accent1"/>
+          </a:effectRef>
+          <a:fontRef idx="minor">
+            <a:schemeClr val="lt1"/>
+          </a:fontRef>
+        </p:style>
+        <p:txBody>
+          <a:bodyPr wrap="square" rtlCol="0" anchor="ctr">
+            <a:noAutofit/>
+          </a:bodyPr>
+          <a:lstStyle/>
+          <a:p>
+            <a:pPr algn="ctr"/>
+            <a:endParaRPr lang="en-US"/>
+          </a:p>
+        </p:txBody>
+      </p:sp>
+      <p:sp>
+        <p:nvSpPr>
+          <p:cNvPr id="2" name="Title 1">
+            <a:extLst>
+              <a:ext uri="{FF2B5EF4-FFF2-40B4-BE49-F238E27FC236}">
+                <a16:creationId xmlns:a16="http://schemas.microsoft.com/office/drawing/2014/main" id="{452AB703-D6F1-416B-B24B-A193C1FDEE55}"/>
+              </a:ext>
+            </a:extLst>
+          </p:cNvPr>
+          <p:cNvSpPr>
+            <a:spLocks noGrp="1"/>
+          </p:cNvSpPr>
+          <p:nvPr>
+            <p:ph type="title"/>
+          </p:nvPr>
+        </p:nvSpPr>
+        <p:spPr>
+          <a:xfrm>
+            <a:off x="838200" y="365125"/>
+            <a:ext cx="10515600" cy="1325563"/>
+          </a:xfrm>
+        </p:spPr>
+        <p:txBody>
+          <a:bodyPr>
+            <a:normAutofit/>
+          </a:bodyPr>
+          <a:lstStyle/>
+          <a:p>
+            <a:r>
+              <a:rPr lang="en-SG" dirty="0"/>
+              <a:t>Driving Licence Dataset</a:t>
+            </a:r>
+          </a:p>
+        </p:txBody>
+      </p:sp>
+      <p:sp>
+        <p:nvSpPr>
+          <p:cNvPr id="10" name="Content Placeholder 9">
+            <a:extLst>
+              <a:ext uri="{FF2B5EF4-FFF2-40B4-BE49-F238E27FC236}">
+                <a16:creationId xmlns:a16="http://schemas.microsoft.com/office/drawing/2014/main" id="{14B60C4D-C500-40AA-BB0D-3D4E7B4F2A84}"/>
+              </a:ext>
+            </a:extLst>
+          </p:cNvPr>
+          <p:cNvSpPr>
+            <a:spLocks noGrp="1"/>
+          </p:cNvSpPr>
+          <p:nvPr>
+            <p:ph idx="1"/>
+          </p:nvPr>
+        </p:nvSpPr>
+        <p:spPr>
+          <a:xfrm>
+            <a:off x="838200" y="2015406"/>
+            <a:ext cx="5097779" cy="4065986"/>
+          </a:xfrm>
+        </p:spPr>
+        <p:txBody>
+          <a:bodyPr anchor="t">
+            <a:normAutofit/>
+          </a:bodyPr>
+          <a:lstStyle/>
+          <a:p>
+            <a:r>
+              <a:rPr lang="en-US" sz="2000" dirty="0">
+                <a:solidFill>
+                  <a:srgbClr val="FFFFFF"/>
+                </a:solidFill>
+              </a:rPr>
+              <a:t>End Of The Year</a:t>
+            </a:r>
+          </a:p>
+          <a:p>
+            <a:r>
+              <a:rPr lang="en-US" sz="2000" dirty="0">
+                <a:solidFill>
+                  <a:srgbClr val="FFFFFF"/>
+                </a:solidFill>
+              </a:rPr>
+              <a:t>Total Number</a:t>
+            </a:r>
+          </a:p>
+          <a:p>
+            <a:r>
+              <a:rPr lang="en-US" sz="2000" dirty="0">
+                <a:solidFill>
+                  <a:srgbClr val="FFFFFF"/>
+                </a:solidFill>
+              </a:rPr>
+              <a:t>Overlapping Of Licenses</a:t>
+            </a:r>
+          </a:p>
+        </p:txBody>
+      </p:sp>
+      <p:pic>
+        <p:nvPicPr>
+          <p:cNvPr id="5" name="Content Placeholder 4">
+            <a:extLst>
+              <a:ext uri="{FF2B5EF4-FFF2-40B4-BE49-F238E27FC236}">
+                <a16:creationId xmlns:a16="http://schemas.microsoft.com/office/drawing/2014/main" id="{BE3A6E7C-7F30-4B41-AF5B-379C74A6ADB4}"/>
+              </a:ext>
+            </a:extLst>
+          </p:cNvPr>
+          <p:cNvPicPr>
+            <a:picLocks noChangeAspect="1"/>
+          </p:cNvPicPr>
+          <p:nvPr/>
+        </p:nvPicPr>
+        <p:blipFill>
+          <a:blip r:embed="rId2"/>
+          <a:stretch>
+            <a:fillRect/>
+          </a:stretch>
+        </p:blipFill>
+        <p:spPr>
+          <a:xfrm>
+            <a:off x="8661856" y="2077419"/>
+            <a:ext cx="2152670" cy="3341191"/>
+          </a:xfrm>
+          <a:custGeom>
+            <a:avLst/>
+            <a:gdLst>
+              <a:gd name="connsiteX0" fmla="*/ 0 w 4636009"/>
+              <a:gd name="connsiteY0" fmla="*/ 0 h 5032375"/>
+              <a:gd name="connsiteX1" fmla="*/ 4636009 w 4636009"/>
+              <a:gd name="connsiteY1" fmla="*/ 0 h 5032375"/>
+              <a:gd name="connsiteX2" fmla="*/ 4636009 w 4636009"/>
+              <a:gd name="connsiteY2" fmla="*/ 5032375 h 5032375"/>
+              <a:gd name="connsiteX3" fmla="*/ 0 w 4636009"/>
+              <a:gd name="connsiteY3" fmla="*/ 5032375 h 5032375"/>
+            </a:gdLst>
+            <a:ahLst/>
+            <a:cxnLst>
+              <a:cxn ang="0">
+                <a:pos x="connsiteX0" y="connsiteY0"/>
+              </a:cxn>
+              <a:cxn ang="0">
+                <a:pos x="connsiteX1" y="connsiteY1"/>
+              </a:cxn>
+              <a:cxn ang="0">
+                <a:pos x="connsiteX2" y="connsiteY2"/>
+              </a:cxn>
+              <a:cxn ang="0">
+                <a:pos x="connsiteX3" y="connsiteY3"/>
+              </a:cxn>
+            </a:cxnLst>
+            <a:rect l="l" t="t" r="r" b="b"/>
+            <a:pathLst>
+              <a:path w="4636009" h="5032375">
+                <a:moveTo>
+                  <a:pt x="0" y="0"/>
+                </a:moveTo>
+                <a:lnTo>
+                  <a:pt x="4636009" y="0"/>
+                </a:lnTo>
+                <a:lnTo>
+                  <a:pt x="4636009" y="5032375"/>
+                </a:lnTo>
+                <a:lnTo>
+                  <a:pt x="0" y="5032375"/>
+                </a:lnTo>
+                <a:close/>
+              </a:path>
+            </a:pathLst>
+          </a:custGeom>
+        </p:spPr>
+      </p:pic>
+      <p:pic>
+        <p:nvPicPr>
+          <p:cNvPr id="6" name="Picture 5">
+            <a:extLst>
+              <a:ext uri="{FF2B5EF4-FFF2-40B4-BE49-F238E27FC236}">
+                <a16:creationId xmlns:a16="http://schemas.microsoft.com/office/drawing/2014/main" id="{15EFD3C4-73F1-4925-BE16-FB048382FDBC}"/>
+              </a:ext>
+            </a:extLst>
+          </p:cNvPr>
+          <p:cNvPicPr>
+            <a:picLocks noChangeAspect="1"/>
+          </p:cNvPicPr>
+          <p:nvPr/>
+        </p:nvPicPr>
+        <p:blipFill>
+          <a:blip r:embed="rId3"/>
+          <a:stretch>
+            <a:fillRect/>
+          </a:stretch>
+        </p:blipFill>
+        <p:spPr>
+          <a:xfrm>
+            <a:off x="5935979" y="6081392"/>
+            <a:ext cx="6173007" cy="571002"/>
+          </a:xfrm>
+          <a:custGeom>
+            <a:avLst/>
+            <a:gdLst>
+              <a:gd name="connsiteX0" fmla="*/ 0 w 4636009"/>
+              <a:gd name="connsiteY0" fmla="*/ 0 h 5032375"/>
+              <a:gd name="connsiteX1" fmla="*/ 4636009 w 4636009"/>
+              <a:gd name="connsiteY1" fmla="*/ 0 h 5032375"/>
+              <a:gd name="connsiteX2" fmla="*/ 4636009 w 4636009"/>
+              <a:gd name="connsiteY2" fmla="*/ 5032375 h 5032375"/>
+              <a:gd name="connsiteX3" fmla="*/ 0 w 4636009"/>
+              <a:gd name="connsiteY3" fmla="*/ 5032375 h 5032375"/>
+            </a:gdLst>
+            <a:ahLst/>
+            <a:cxnLst>
+              <a:cxn ang="0">
+                <a:pos x="connsiteX0" y="connsiteY0"/>
+              </a:cxn>
+              <a:cxn ang="0">
+                <a:pos x="connsiteX1" y="connsiteY1"/>
+              </a:cxn>
+              <a:cxn ang="0">
+                <a:pos x="connsiteX2" y="connsiteY2"/>
+              </a:cxn>
+              <a:cxn ang="0">
+                <a:pos x="connsiteX3" y="connsiteY3"/>
+              </a:cxn>
+            </a:cxnLst>
+            <a:rect l="l" t="t" r="r" b="b"/>
+            <a:pathLst>
+              <a:path w="4636009" h="5032375">
+                <a:moveTo>
+                  <a:pt x="0" y="0"/>
+                </a:moveTo>
+                <a:lnTo>
+                  <a:pt x="4636009" y="0"/>
+                </a:lnTo>
+                <a:lnTo>
+                  <a:pt x="4636009" y="5032375"/>
+                </a:lnTo>
+                <a:lnTo>
+                  <a:pt x="0" y="5032375"/>
+                </a:lnTo>
+                <a:close/>
+              </a:path>
+            </a:pathLst>
+          </a:custGeom>
+        </p:spPr>
+      </p:pic>
+    </p:spTree>
+    <p:extLst>
+      <p:ext uri="{BB962C8B-B14F-4D97-AF65-F5344CB8AC3E}">
+        <p14:creationId xmlns:p14="http://schemas.microsoft.com/office/powerpoint/2010/main" val="2877964168"/>
+      </p:ext>
+    </p:extLst>
+  </p:cSld>
+  <p:clrMapOvr>
+    <a:masterClrMapping/>
+  </p:clrMapOvr>
+</p:sld>
+</file>
+
+<file path=ppt/slides/slide9.xml><?xml version="1.0" encoding="utf-8"?>
+<p:sld xmlns:a="http://schemas.openxmlformats.org/drawingml/2006/main" xmlns:r="http://schemas.openxmlformats.org/officeDocument/2006/relationships" xmlns:p="http://schemas.openxmlformats.org/presentationml/2006/main">
+  <p:cSld>
+    <p:bg>
+      <p:bgPr>
+        <a:solidFill>
+          <a:schemeClr val="bg1"/>
+        </a:solidFill>
+        <a:effectLst/>
+      </p:bgPr>
+    </p:bg>
+    <p:spTree>
+      <p:nvGrpSpPr>
+        <p:cNvPr id="1" name=""/>
+        <p:cNvGrpSpPr/>
+        <p:nvPr/>
+      </p:nvGrpSpPr>
+      <p:grpSpPr>
+        <a:xfrm>
+          <a:off x="0" y="0"/>
+          <a:ext cx="0" cy="0"/>
+          <a:chOff x="0" y="0"/>
+          <a:chExt cx="0" cy="0"/>
+        </a:xfrm>
+      </p:grpSpPr>
+      <p:sp useBgFill="1">
+        <p:nvSpPr>
+          <p:cNvPr id="75" name="Rectangle 74">
+            <a:extLst>
+              <a:ext uri="{FF2B5EF4-FFF2-40B4-BE49-F238E27FC236}">
+                <a16:creationId xmlns:a16="http://schemas.microsoft.com/office/drawing/2014/main" id="{385E1BDC-A9B0-4A87-82E3-F3187F69A802}"/>
+              </a:ext>
+              <a:ext uri="{C183D7F6-B498-43B3-948B-1728B52AA6E4}">
+                <adec:decorative xmlns:adec="http://schemas.microsoft.com/office/drawing/2017/decorative" val="1"/>
+              </a:ext>
+            </a:extLst>
+          </p:cNvPr>
+          <p:cNvSpPr>
+            <a:spLocks noGrp="1" noRot="1" noChangeAspect="1" noMove="1" noResize="1" noEditPoints="1" noAdjustHandles="1" noChangeArrowheads="1" noChangeShapeType="1" noTextEdit="1"/>
+          </p:cNvSpPr>
+          <p:nvPr>
+            <p:extLst>
+              <p:ext uri="{386F3935-93C4-4BCD-93E2-E3B085C9AB24}">
+                <p16:designElem xmlns:p16="http://schemas.microsoft.com/office/powerpoint/2015/main" val="1"/>
+              </p:ext>
+            </p:extLst>
+          </p:nvPr>
+        </p:nvSpPr>
+        <p:spPr>
+          <a:xfrm>
+            <a:off x="0" y="0"/>
+            <a:ext cx="12192000" cy="6858000"/>
+          </a:xfrm>
+          <a:prstGeom prst="rect">
+            <a:avLst/>
+          </a:prstGeom>
+          <a:ln>
+            <a:noFill/>
+          </a:ln>
+        </p:spPr>
+        <p:style>
+          <a:lnRef idx="2">
+            <a:schemeClr val="accent1">
+              <a:shade val="50000"/>
+            </a:schemeClr>
+          </a:lnRef>
+          <a:fillRef idx="1">
+            <a:schemeClr val="accent1"/>
+          </a:fillRef>
+          <a:effectRef idx="0">
+            <a:schemeClr val="accent1"/>
+          </a:effectRef>
+          <a:fontRef idx="minor">
+            <a:schemeClr val="lt1"/>
+          </a:fontRef>
+        </p:style>
+        <p:txBody>
+          <a:bodyPr rtlCol="0" anchor="ctr"/>
+          <a:lstStyle/>
+          <a:p>
+            <a:pPr algn="ctr"/>
+            <a:endParaRPr lang="en-US"/>
+          </a:p>
+        </p:txBody>
+      </p:sp>
+      <p:sp useBgFill="1">
+        <p:nvSpPr>
+          <p:cNvPr id="77" name="Rectangle 76">
+            <a:extLst>
+              <a:ext uri="{FF2B5EF4-FFF2-40B4-BE49-F238E27FC236}">
+                <a16:creationId xmlns:a16="http://schemas.microsoft.com/office/drawing/2014/main" id="{0990C621-3B8B-4820-8328-D47EF7CE823C}"/>
+              </a:ext>
+              <a:ext uri="{C183D7F6-B498-43B3-948B-1728B52AA6E4}">
+                <adec:decorative xmlns:adec="http://schemas.microsoft.com/office/drawing/2017/decorative" val="1"/>
+              </a:ext>
+            </a:extLst>
+          </p:cNvPr>
+          <p:cNvSpPr>
+            <a:spLocks noGrp="1" noRot="1" noChangeAspect="1" noMove="1" noResize="1" noEditPoints="1" noAdjustHandles="1" noChangeArrowheads="1" noChangeShapeType="1" noTextEdit="1"/>
+          </p:cNvSpPr>
+          <p:nvPr>
+            <p:extLst>
+              <p:ext uri="{386F3935-93C4-4BCD-93E2-E3B085C9AB24}">
+                <p16:designElem xmlns:p16="http://schemas.microsoft.com/office/powerpoint/2015/main" val="1"/>
+              </p:ext>
+            </p:extLst>
+          </p:nvPr>
+        </p:nvSpPr>
+        <p:spPr>
+          <a:xfrm>
+            <a:off x="554416" y="365125"/>
+            <a:ext cx="11167447" cy="2089317"/>
+          </a:xfrm>
+          <a:prstGeom prst="rect">
+            <a:avLst/>
+          </a:prstGeom>
+          <a:ln w="12700">
+            <a:solidFill>
+              <a:srgbClr val="EFEFEF"/>
+            </a:solidFill>
+          </a:ln>
+          <a:effectLst>
+            <a:outerShdw blurRad="50800" dist="38100" dir="2700000" algn="tl" rotWithShape="0">
+              <a:schemeClr val="bg2">
+                <a:lumMod val="85000"/>
+                <a:alpha val="30000"/>
+              </a:schemeClr>
+            </a:outerShdw>
+          </a:effectLst>
+        </p:spPr>
+        <p:style>
+          <a:lnRef idx="2">
+            <a:schemeClr val="accent1">
+              <a:shade val="50000"/>
+            </a:schemeClr>
+          </a:lnRef>
+          <a:fillRef idx="1">
+            <a:schemeClr val="accent1"/>
+          </a:fillRef>
+          <a:effectRef idx="0">
+            <a:schemeClr val="accent1"/>
+          </a:effectRef>
+          <a:fontRef idx="minor">
+            <a:schemeClr val="lt1"/>
+          </a:fontRef>
+        </p:style>
+        <p:txBody>
+          <a:bodyPr rtlCol="0" anchor="ctr"/>
+          <a:lstStyle/>
+          <a:p>
+            <a:pPr marL="0" marR="0" lvl="0" indent="0" algn="ctr" defTabSz="914400" rtl="0" eaLnBrk="1" fontAlgn="auto" latinLnBrk="0" hangingPunct="1">
+              <a:lnSpc>
+                <a:spcPct val="100000"/>
+              </a:lnSpc>
+              <a:spcBef>
+                <a:spcPts val="0"/>
+              </a:spcBef>
+              <a:spcAft>
+                <a:spcPts val="0"/>
+              </a:spcAft>
+              <a:buClrTx/>
+              <a:buSzTx/>
+              <a:buFontTx/>
+              <a:buNone/>
+              <a:tabLst/>
+              <a:defRPr/>
+            </a:pPr>
+            <a:endParaRPr kumimoji="0" lang="en-US" sz="1800" b="0" i="0" u="none" strike="noStrike" kern="1200" cap="none" spc="0" normalizeH="0" baseline="0" noProof="0">
+              <a:ln>
+                <a:noFill/>
+              </a:ln>
+              <a:solidFill>
+                <a:prstClr val="white"/>
+              </a:solidFill>
+              <a:effectLst/>
+              <a:uLnTx/>
+              <a:uFillTx/>
+              <a:latin typeface="Calibri" panose="020F0502020204030204"/>
+              <a:ea typeface="+mn-ea"/>
+              <a:cs typeface="+mn-cs"/>
+            </a:endParaRPr>
+          </a:p>
+        </p:txBody>
+      </p:sp>
+      <p:sp>
+        <p:nvSpPr>
+          <p:cNvPr id="2" name="Title 1">
+            <a:extLst>
+              <a:ext uri="{FF2B5EF4-FFF2-40B4-BE49-F238E27FC236}">
+                <a16:creationId xmlns:a16="http://schemas.microsoft.com/office/drawing/2014/main" id="{4A218608-31C1-44E9-8383-CE4345C7EC42}"/>
+              </a:ext>
+            </a:extLst>
+          </p:cNvPr>
+          <p:cNvSpPr>
+            <a:spLocks noGrp="1"/>
+          </p:cNvSpPr>
+          <p:nvPr>
+            <p:ph type="title"/>
+          </p:nvPr>
+        </p:nvSpPr>
+        <p:spPr>
+          <a:xfrm>
+            <a:off x="1051560" y="586822"/>
+            <a:ext cx="3657600" cy="1645920"/>
+          </a:xfrm>
+        </p:spPr>
+        <p:txBody>
+          <a:bodyPr vert="horz" lIns="91440" tIns="45720" rIns="91440" bIns="45720" rtlCol="0">
+            <a:normAutofit/>
+          </a:bodyPr>
+          <a:lstStyle/>
+          <a:p>
+            <a:r>
+              <a:rPr lang="en-US" sz="3200"/>
+              <a:t>The Number Of Driving Licenses In The Last Decade</a:t>
+            </a:r>
+            <a:endParaRPr lang="en-US" sz="3200" kern="1200">
+              <a:latin typeface="+mj-lt"/>
+              <a:ea typeface="+mj-ea"/>
+              <a:cs typeface="+mj-cs"/>
+            </a:endParaRPr>
+          </a:p>
+        </p:txBody>
+      </p:sp>
+      <p:sp>
+        <p:nvSpPr>
+          <p:cNvPr id="79" name="Rectangle 78">
+            <a:extLst>
+              <a:ext uri="{FF2B5EF4-FFF2-40B4-BE49-F238E27FC236}">
+                <a16:creationId xmlns:a16="http://schemas.microsoft.com/office/drawing/2014/main" id="{C1A2385B-1D2A-4E17-84FA-6CB7F0AAE473}"/>
+              </a:ext>
+              <a:ext uri="{C183D7F6-B498-43B3-948B-1728B52AA6E4}">
+                <adec:decorative xmlns:adec="http://schemas.microsoft.com/office/drawing/2017/decorative" val="1"/>
+              </a:ext>
+            </a:extLst>
+          </p:cNvPr>
+          <p:cNvSpPr>
+            <a:spLocks noGrp="1" noRot="1" noChangeAspect="1" noMove="1" noResize="1" noEditPoints="1" noAdjustHandles="1" noChangeArrowheads="1" noChangeShapeType="1" noTextEdit="1"/>
+          </p:cNvSpPr>
+          <p:nvPr>
+            <p:extLst>
+              <p:ext uri="{386F3935-93C4-4BCD-93E2-E3B085C9AB24}">
+                <p16:designElem xmlns:p16="http://schemas.microsoft.com/office/powerpoint/2015/main" val="1"/>
+              </p:ext>
+            </p:extLst>
+          </p:nvPr>
+        </p:nvSpPr>
+        <p:spPr>
+          <a:xfrm>
+            <a:off x="490408" y="1057739"/>
+            <a:ext cx="128016" cy="704088"/>
+          </a:xfrm>
+          <a:prstGeom prst="rect">
+            <a:avLst/>
+          </a:prstGeom>
+          <a:solidFill>
+            <a:schemeClr val="accent2"/>
+          </a:solidFill>
+          <a:ln>
+            <a:noFill/>
+          </a:ln>
+        </p:spPr>
+        <p:style>
+          <a:lnRef idx="2">
+            <a:schemeClr val="accent1">
+              <a:shade val="50000"/>
+            </a:schemeClr>
+          </a:lnRef>
+          <a:fillRef idx="1">
+            <a:schemeClr val="accent1"/>
+          </a:fillRef>
+          <a:effectRef idx="0">
+            <a:schemeClr val="accent1"/>
+          </a:effectRef>
+          <a:fontRef idx="minor">
+            <a:schemeClr val="lt1"/>
+          </a:fontRef>
+        </p:style>
+        <p:txBody>
+          <a:bodyPr rtlCol="0" anchor="ctr"/>
+          <a:lstStyle/>
+          <a:p>
+            <a:pPr algn="ctr"/>
+            <a:endParaRPr lang="en-US" dirty="0">
+              <a:solidFill>
+                <a:prstClr val="white"/>
+              </a:solidFill>
+              <a:latin typeface="Calibri" panose="020F0502020204030204"/>
+            </a:endParaRPr>
+          </a:p>
+        </p:txBody>
+      </p:sp>
+      <p:sp>
+        <p:nvSpPr>
+          <p:cNvPr id="81" name="Rectangle 80">
+            <a:extLst>
+              <a:ext uri="{FF2B5EF4-FFF2-40B4-BE49-F238E27FC236}">
+                <a16:creationId xmlns:a16="http://schemas.microsoft.com/office/drawing/2014/main" id="{5E791F2F-79DB-4CC0-9FA1-001E3E91E8B7}"/>
+              </a:ext>
+              <a:ext uri="{C183D7F6-B498-43B3-948B-1728B52AA6E4}">
+                <adec:decorative xmlns:adec="http://schemas.microsoft.com/office/drawing/2017/decorative" val="1"/>
+              </a:ext>
+            </a:extLst>
+          </p:cNvPr>
+          <p:cNvSpPr>
+            <a:spLocks noGrp="1" noRot="1" noChangeAspect="1" noMove="1" noResize="1" noEditPoints="1" noAdjustHandles="1" noChangeArrowheads="1" noChangeShapeType="1" noTextEdit="1"/>
+          </p:cNvSpPr>
+          <p:nvPr>
+            <p:extLst>
+              <p:ext uri="{386F3935-93C4-4BCD-93E2-E3B085C9AB24}">
+                <p16:designElem xmlns:p16="http://schemas.microsoft.com/office/powerpoint/2015/main" val="1"/>
+              </p:ext>
+            </p:extLst>
+          </p:nvPr>
+        </p:nvSpPr>
+        <p:spPr>
+          <a:xfrm rot="5400000">
+            <a:off x="4248113" y="1405210"/>
+            <a:ext cx="1463040" cy="9144"/>
+          </a:xfrm>
+          <a:prstGeom prst="rect">
+            <a:avLst/>
+          </a:prstGeom>
+          <a:solidFill>
+            <a:srgbClr val="D5D5D5"/>
+          </a:solidFill>
+          <a:ln w="3175">
+            <a:noFill/>
+          </a:ln>
+          <a:effectLst/>
+        </p:spPr>
+        <p:style>
+          <a:lnRef idx="2">
+            <a:schemeClr val="accent1">
+              <a:shade val="50000"/>
+            </a:schemeClr>
+          </a:lnRef>
+          <a:fillRef idx="1">
+            <a:schemeClr val="accent1"/>
+          </a:fillRef>
+          <a:effectRef idx="0">
+            <a:schemeClr val="accent1"/>
+          </a:effectRef>
+          <a:fontRef idx="minor">
+            <a:schemeClr val="lt1"/>
+          </a:fontRef>
+        </p:style>
+        <p:txBody>
+          <a:bodyPr rtlCol="0" anchor="ctr"/>
+          <a:lstStyle/>
+          <a:p>
+            <a:pPr marL="0" marR="0" lvl="0" indent="0" algn="ctr" defTabSz="914400" rtl="0" eaLnBrk="1" fontAlgn="auto" latinLnBrk="0" hangingPunct="1">
+              <a:lnSpc>
+                <a:spcPct val="100000"/>
+              </a:lnSpc>
+              <a:spcBef>
+                <a:spcPts val="0"/>
+              </a:spcBef>
+              <a:spcAft>
+                <a:spcPts val="0"/>
+              </a:spcAft>
+              <a:buClrTx/>
+              <a:buSzTx/>
+              <a:buFontTx/>
+              <a:buNone/>
+              <a:tabLst/>
+              <a:defRPr/>
+            </a:pPr>
+            <a:endParaRPr kumimoji="0" lang="en-US" sz="1800" b="0" i="0" u="none" strike="noStrike" kern="1200" cap="none" spc="0" normalizeH="0" baseline="0" noProof="0">
+              <a:ln>
+                <a:noFill/>
+              </a:ln>
+              <a:solidFill>
+                <a:prstClr val="white"/>
+              </a:solidFill>
+              <a:effectLst/>
+              <a:uLnTx/>
+              <a:uFillTx/>
+              <a:latin typeface="Calibri" panose="020F0502020204030204"/>
+              <a:ea typeface="+mn-ea"/>
+              <a:cs typeface="+mn-cs"/>
+            </a:endParaRPr>
+          </a:p>
+        </p:txBody>
+      </p:sp>
+      <p:sp>
+        <p:nvSpPr>
+          <p:cNvPr id="3" name="Content Placeholder 2">
+            <a:extLst>
+              <a:ext uri="{FF2B5EF4-FFF2-40B4-BE49-F238E27FC236}">
+                <a16:creationId xmlns:a16="http://schemas.microsoft.com/office/drawing/2014/main" id="{078334CF-3C26-4F0A-88F9-73BA5DDACA99}"/>
+              </a:ext>
+            </a:extLst>
+          </p:cNvPr>
+          <p:cNvSpPr>
+            <a:spLocks noGrp="1"/>
+          </p:cNvSpPr>
+          <p:nvPr>
+            <p:ph idx="1"/>
+          </p:nvPr>
+        </p:nvSpPr>
+        <p:spPr>
+          <a:xfrm>
+            <a:off x="5250106" y="586822"/>
+            <a:ext cx="6106742" cy="1645920"/>
+          </a:xfrm>
+        </p:spPr>
+        <p:txBody>
+          <a:bodyPr vert="horz" lIns="91440" tIns="45720" rIns="91440" bIns="45720" rtlCol="0" anchor="ctr">
+            <a:normAutofit/>
+          </a:bodyPr>
+          <a:lstStyle/>
+          <a:p>
+            <a:pPr marL="285750"/>
+            <a:r>
+              <a:rPr lang="en-US" sz="1800" dirty="0"/>
+              <a:t>Gradual Increase Over The Years</a:t>
+            </a:r>
+          </a:p>
+        </p:txBody>
+      </p:sp>
+      <p:pic>
+        <p:nvPicPr>
+          <p:cNvPr id="3078" name="Picture 6">
+            <a:extLst>
+              <a:ext uri="{FF2B5EF4-FFF2-40B4-BE49-F238E27FC236}">
+                <a16:creationId xmlns:a16="http://schemas.microsoft.com/office/drawing/2014/main" id="{72BD2DF9-9DCC-49F6-A716-A4F07B24B3FF}"/>
+              </a:ext>
+            </a:extLst>
+          </p:cNvPr>
+          <p:cNvPicPr>
+            <a:picLocks noChangeAspect="1" noChangeArrowheads="1"/>
+          </p:cNvPicPr>
+          <p:nvPr/>
+        </p:nvPicPr>
+        <p:blipFill>
+          <a:blip r:embed="rId2">
+            <a:extLst>
+              <a:ext uri="{28A0092B-C50C-407E-A947-70E740481C1C}">
+                <a14:useLocalDpi xmlns:a14="http://schemas.microsoft.com/office/drawing/2010/main" val="0"/>
+              </a:ext>
+            </a:extLst>
+          </a:blip>
+          <a:stretch>
+            <a:fillRect/>
+          </a:stretch>
+        </p:blipFill>
+        <p:spPr bwMode="auto">
+          <a:xfrm>
+            <a:off x="5508224" y="2819567"/>
+            <a:ext cx="6213640" cy="3137888"/>
+          </a:xfrm>
+          <a:prstGeom prst="rect">
+            <a:avLst/>
+          </a:prstGeom>
+          <a:noFill/>
+          <a:extLst>
+            <a:ext uri="{909E8E84-426E-40DD-AFC4-6F175D3DCCD1}">
+              <a14:hiddenFill xmlns:a14="http://schemas.microsoft.com/office/drawing/2010/main">
+                <a:solidFill>
+                  <a:srgbClr val="FFFFFF"/>
+                </a:solidFill>
+              </a14:hiddenFill>
+            </a:ext>
+          </a:extLst>
+        </p:spPr>
+      </p:pic>
+      <p:pic>
+        <p:nvPicPr>
+          <p:cNvPr id="6" name="Picture 5">
+            <a:extLst>
+              <a:ext uri="{FF2B5EF4-FFF2-40B4-BE49-F238E27FC236}">
+                <a16:creationId xmlns:a16="http://schemas.microsoft.com/office/drawing/2014/main" id="{41FC1A11-7A3F-44A4-AD4E-F75B6F87F4AD}"/>
+              </a:ext>
+            </a:extLst>
+          </p:cNvPr>
+          <p:cNvPicPr>
+            <a:picLocks noChangeAspect="1"/>
+          </p:cNvPicPr>
+          <p:nvPr/>
+        </p:nvPicPr>
+        <p:blipFill>
+          <a:blip r:embed="rId3"/>
+          <a:stretch>
+            <a:fillRect/>
+          </a:stretch>
+        </p:blipFill>
+        <p:spPr>
+          <a:xfrm>
+            <a:off x="59931" y="5457759"/>
+            <a:ext cx="5451229" cy="499696"/>
+          </a:xfrm>
+          <a:prstGeom prst="rect">
+            <a:avLst/>
+          </a:prstGeom>
+        </p:spPr>
+      </p:pic>
+      <p:pic>
+        <p:nvPicPr>
+          <p:cNvPr id="8" name="Picture 7">
+            <a:extLst>
+              <a:ext uri="{FF2B5EF4-FFF2-40B4-BE49-F238E27FC236}">
+                <a16:creationId xmlns:a16="http://schemas.microsoft.com/office/drawing/2014/main" id="{ED07F0B9-55BE-4FE6-B1AC-1DE1CC00B970}"/>
+              </a:ext>
+            </a:extLst>
+          </p:cNvPr>
+          <p:cNvPicPr>
+            <a:picLocks noChangeAspect="1"/>
+          </p:cNvPicPr>
+          <p:nvPr/>
+        </p:nvPicPr>
+        <p:blipFill>
+          <a:blip r:embed="rId4"/>
+          <a:stretch>
+            <a:fillRect/>
+          </a:stretch>
+        </p:blipFill>
+        <p:spPr>
+          <a:xfrm>
+            <a:off x="120764" y="2861920"/>
+            <a:ext cx="5266696" cy="1791651"/>
+          </a:xfrm>
+          <a:prstGeom prst="rect">
+            <a:avLst/>
+          </a:prstGeom>
+        </p:spPr>
+      </p:pic>
+    </p:spTree>
+    <p:extLst>
+      <p:ext uri="{BB962C8B-B14F-4D97-AF65-F5344CB8AC3E}">
+        <p14:creationId xmlns:p14="http://schemas.microsoft.com/office/powerpoint/2010/main" val="1386022858"/>
       </p:ext>
     </p:extLst>
   </p:cSld>

</xml_diff>